<commit_message>
corrected differentiation and freezing
</commit_message>
<xml_diff>
--- a/MaterialReading_etc/CombinedModelFlowcharts.pptx
+++ b/MaterialReading_etc/CombinedModelFlowcharts.pptx
@@ -107,6 +107,11 @@
       </a:defRPr>
     </a:lvl9pPr>
   </p:defaultTextStyle>
+  <p:extLst>
+    <p:ext uri="{EFAFB233-063F-42B5-8137-9DF3F51BA10A}">
+      <p15:sldGuideLst xmlns:p15="http://schemas.microsoft.com/office/powerpoint/2012/main"/>
+    </p:ext>
+  </p:extLst>
 </p:presentation>
 </file>
 
@@ -257,7 +262,7 @@
           <a:p>
             <a:fld id="{5238624F-C034-1A44-92C3-6F2AD22793ED}" type="datetimeFigureOut">
               <a:rPr lang="en-US" smtClean="0"/>
-              <a:t>9/22/23</a:t>
+              <a:t>2/1/24</a:t>
             </a:fld>
             <a:endParaRPr lang="en-US"/>
           </a:p>
@@ -455,7 +460,7 @@
           <a:p>
             <a:fld id="{5238624F-C034-1A44-92C3-6F2AD22793ED}" type="datetimeFigureOut">
               <a:rPr lang="en-US" smtClean="0"/>
-              <a:t>9/22/23</a:t>
+              <a:t>2/1/24</a:t>
             </a:fld>
             <a:endParaRPr lang="en-US"/>
           </a:p>
@@ -663,7 +668,7 @@
           <a:p>
             <a:fld id="{5238624F-C034-1A44-92C3-6F2AD22793ED}" type="datetimeFigureOut">
               <a:rPr lang="en-US" smtClean="0"/>
-              <a:t>9/22/23</a:t>
+              <a:t>2/1/24</a:t>
             </a:fld>
             <a:endParaRPr lang="en-US"/>
           </a:p>
@@ -861,7 +866,7 @@
           <a:p>
             <a:fld id="{5238624F-C034-1A44-92C3-6F2AD22793ED}" type="datetimeFigureOut">
               <a:rPr lang="en-US" smtClean="0"/>
-              <a:t>9/22/23</a:t>
+              <a:t>2/1/24</a:t>
             </a:fld>
             <a:endParaRPr lang="en-US"/>
           </a:p>
@@ -1136,7 +1141,7 @@
           <a:p>
             <a:fld id="{5238624F-C034-1A44-92C3-6F2AD22793ED}" type="datetimeFigureOut">
               <a:rPr lang="en-US" smtClean="0"/>
-              <a:t>9/22/23</a:t>
+              <a:t>2/1/24</a:t>
             </a:fld>
             <a:endParaRPr lang="en-US"/>
           </a:p>
@@ -1401,7 +1406,7 @@
           <a:p>
             <a:fld id="{5238624F-C034-1A44-92C3-6F2AD22793ED}" type="datetimeFigureOut">
               <a:rPr lang="en-US" smtClean="0"/>
-              <a:t>9/22/23</a:t>
+              <a:t>2/1/24</a:t>
             </a:fld>
             <a:endParaRPr lang="en-US"/>
           </a:p>
@@ -1813,7 +1818,7 @@
           <a:p>
             <a:fld id="{5238624F-C034-1A44-92C3-6F2AD22793ED}" type="datetimeFigureOut">
               <a:rPr lang="en-US" smtClean="0"/>
-              <a:t>9/22/23</a:t>
+              <a:t>2/1/24</a:t>
             </a:fld>
             <a:endParaRPr lang="en-US"/>
           </a:p>
@@ -1954,7 +1959,7 @@
           <a:p>
             <a:fld id="{5238624F-C034-1A44-92C3-6F2AD22793ED}" type="datetimeFigureOut">
               <a:rPr lang="en-US" smtClean="0"/>
-              <a:t>9/22/23</a:t>
+              <a:t>2/1/24</a:t>
             </a:fld>
             <a:endParaRPr lang="en-US"/>
           </a:p>
@@ -2067,7 +2072,7 @@
           <a:p>
             <a:fld id="{5238624F-C034-1A44-92C3-6F2AD22793ED}" type="datetimeFigureOut">
               <a:rPr lang="en-US" smtClean="0"/>
-              <a:t>9/22/23</a:t>
+              <a:t>2/1/24</a:t>
             </a:fld>
             <a:endParaRPr lang="en-US"/>
           </a:p>
@@ -2378,7 +2383,7 @@
           <a:p>
             <a:fld id="{5238624F-C034-1A44-92C3-6F2AD22793ED}" type="datetimeFigureOut">
               <a:rPr lang="en-US" smtClean="0"/>
-              <a:t>9/22/23</a:t>
+              <a:t>2/1/24</a:t>
             </a:fld>
             <a:endParaRPr lang="en-US"/>
           </a:p>
@@ -2666,7 +2671,7 @@
           <a:p>
             <a:fld id="{5238624F-C034-1A44-92C3-6F2AD22793ED}" type="datetimeFigureOut">
               <a:rPr lang="en-US" smtClean="0"/>
-              <a:t>9/22/23</a:t>
+              <a:t>2/1/24</a:t>
             </a:fld>
             <a:endParaRPr lang="en-US"/>
           </a:p>
@@ -2907,7 +2912,7 @@
           <a:p>
             <a:fld id="{5238624F-C034-1A44-92C3-6F2AD22793ED}" type="datetimeFigureOut">
               <a:rPr lang="en-US" smtClean="0"/>
-              <a:t>9/22/23</a:t>
+              <a:t>2/1/24</a:t>
             </a:fld>
             <a:endParaRPr lang="en-US"/>
           </a:p>
@@ -19510,10 +19515,10 @@
       </p:pic>
       <p:pic>
         <p:nvPicPr>
-          <p:cNvPr id="57" name="Graphic 56" descr="Checkmark with solid fill">
-            <a:extLst>
-              <a:ext uri="{FF2B5EF4-FFF2-40B4-BE49-F238E27FC236}">
-                <a16:creationId xmlns:a16="http://schemas.microsoft.com/office/drawing/2014/main" id="{B3F01984-6A2E-5DD7-3C4C-705F94F5DF78}"/>
+          <p:cNvPr id="77" name="Graphic 76" descr="Checkmark with solid fill">
+            <a:extLst>
+              <a:ext uri="{FF2B5EF4-FFF2-40B4-BE49-F238E27FC236}">
+                <a16:creationId xmlns:a16="http://schemas.microsoft.com/office/drawing/2014/main" id="{6BE71017-D3A0-5A15-C9AC-83F2241968EB}"/>
               </a:ext>
             </a:extLst>
           </p:cNvPr>
@@ -19536,7 +19541,7 @@
         </p:blipFill>
         <p:spPr>
           <a:xfrm>
-            <a:off x="7082224" y="1037368"/>
+            <a:off x="10890340" y="1019172"/>
             <a:ext cx="442106" cy="442106"/>
           </a:xfrm>
           <a:prstGeom prst="rect">
@@ -19546,10 +19551,10 @@
       </p:pic>
       <p:pic>
         <p:nvPicPr>
-          <p:cNvPr id="77" name="Graphic 76" descr="Checkmark with solid fill">
-            <a:extLst>
-              <a:ext uri="{FF2B5EF4-FFF2-40B4-BE49-F238E27FC236}">
-                <a16:creationId xmlns:a16="http://schemas.microsoft.com/office/drawing/2014/main" id="{6BE71017-D3A0-5A15-C9AC-83F2241968EB}"/>
+          <p:cNvPr id="78" name="Graphic 77" descr="Checkmark with solid fill">
+            <a:extLst>
+              <a:ext uri="{FF2B5EF4-FFF2-40B4-BE49-F238E27FC236}">
+                <a16:creationId xmlns:a16="http://schemas.microsoft.com/office/drawing/2014/main" id="{9CFFC433-D088-C2A0-4103-6B6BF757929E}"/>
               </a:ext>
             </a:extLst>
           </p:cNvPr>
@@ -19572,7 +19577,7 @@
         </p:blipFill>
         <p:spPr>
           <a:xfrm>
-            <a:off x="10890340" y="1019172"/>
+            <a:off x="8960637" y="1034910"/>
             <a:ext cx="442106" cy="442106"/>
           </a:xfrm>
           <a:prstGeom prst="rect">
@@ -19582,10 +19587,10 @@
       </p:pic>
       <p:pic>
         <p:nvPicPr>
-          <p:cNvPr id="78" name="Graphic 77" descr="Checkmark with solid fill">
-            <a:extLst>
-              <a:ext uri="{FF2B5EF4-FFF2-40B4-BE49-F238E27FC236}">
-                <a16:creationId xmlns:a16="http://schemas.microsoft.com/office/drawing/2014/main" id="{9CFFC433-D088-C2A0-4103-6B6BF757929E}"/>
+          <p:cNvPr id="94" name="Graphic 93" descr="Checkmark with solid fill">
+            <a:extLst>
+              <a:ext uri="{FF2B5EF4-FFF2-40B4-BE49-F238E27FC236}">
+                <a16:creationId xmlns:a16="http://schemas.microsoft.com/office/drawing/2014/main" id="{FC149653-E51D-F288-BDA5-5F3629BD64A6}"/>
               </a:ext>
             </a:extLst>
           </p:cNvPr>
@@ -19595,10 +19600,10 @@
           <p:nvPr/>
         </p:nvPicPr>
         <p:blipFill>
-          <a:blip r:embed="rId2">
+          <a:blip r:embed="rId4">
             <a:extLst>
               <a:ext uri="{96DAC541-7B7A-43D3-8B79-37D633B846F1}">
-                <asvg:svgBlip xmlns:asvg="http://schemas.microsoft.com/office/drawing/2016/SVG/main" r:embed="rId3"/>
+                <asvg:svgBlip xmlns:asvg="http://schemas.microsoft.com/office/drawing/2016/SVG/main" r:embed="rId5"/>
               </a:ext>
             </a:extLst>
           </a:blip>
@@ -19608,7 +19613,7 @@
         </p:blipFill>
         <p:spPr>
           <a:xfrm>
-            <a:off x="8960637" y="1034910"/>
+            <a:off x="2956262" y="1040443"/>
             <a:ext cx="442106" cy="442106"/>
           </a:xfrm>
           <a:prstGeom prst="rect">
@@ -19616,66 +19621,12 @@
           </a:prstGeom>
         </p:spPr>
       </p:pic>
-      <p:sp>
-        <p:nvSpPr>
-          <p:cNvPr id="93" name="Multiply 92">
-            <a:extLst>
-              <a:ext uri="{FF2B5EF4-FFF2-40B4-BE49-F238E27FC236}">
-                <a16:creationId xmlns:a16="http://schemas.microsoft.com/office/drawing/2014/main" id="{84A2CAC2-A5DE-6D10-DB3F-B9DEED171EE7}"/>
-              </a:ext>
-            </a:extLst>
-          </p:cNvPr>
-          <p:cNvSpPr/>
-          <p:nvPr/>
-        </p:nvSpPr>
-        <p:spPr>
-          <a:xfrm>
-            <a:off x="4782689" y="816429"/>
-            <a:ext cx="648687" cy="673157"/>
-          </a:xfrm>
-          <a:prstGeom prst="mathMultiply">
-            <a:avLst>
-              <a:gd name="adj1" fmla="val 15246"/>
-            </a:avLst>
-          </a:prstGeom>
-          <a:solidFill>
-            <a:srgbClr val="FF0000"/>
-          </a:solidFill>
-          <a:ln>
-            <a:noFill/>
-          </a:ln>
-        </p:spPr>
-        <p:style>
-          <a:lnRef idx="2">
-            <a:schemeClr val="accent1">
-              <a:shade val="50000"/>
-            </a:schemeClr>
-          </a:lnRef>
-          <a:fillRef idx="1">
-            <a:schemeClr val="accent1"/>
-          </a:fillRef>
-          <a:effectRef idx="0">
-            <a:schemeClr val="accent1"/>
-          </a:effectRef>
-          <a:fontRef idx="minor">
-            <a:schemeClr val="lt1"/>
-          </a:fontRef>
-        </p:style>
-        <p:txBody>
-          <a:bodyPr rtlCol="0" anchor="ctr"/>
-          <a:lstStyle/>
-          <a:p>
-            <a:pPr algn="ctr"/>
-            <a:endParaRPr lang="en-US"/>
-          </a:p>
-        </p:txBody>
-      </p:sp>
       <p:pic>
         <p:nvPicPr>
-          <p:cNvPr id="94" name="Graphic 93" descr="Checkmark with solid fill">
-            <a:extLst>
-              <a:ext uri="{FF2B5EF4-FFF2-40B4-BE49-F238E27FC236}">
-                <a16:creationId xmlns:a16="http://schemas.microsoft.com/office/drawing/2014/main" id="{FC149653-E51D-F288-BDA5-5F3629BD64A6}"/>
+          <p:cNvPr id="28" name="Graphic 27" descr="Checkmark with solid fill">
+            <a:extLst>
+              <a:ext uri="{FF2B5EF4-FFF2-40B4-BE49-F238E27FC236}">
+                <a16:creationId xmlns:a16="http://schemas.microsoft.com/office/drawing/2014/main" id="{41D4FB8A-1CE8-F752-F707-8DA1FC2AB8E6}"/>
               </a:ext>
             </a:extLst>
           </p:cNvPr>
@@ -19698,7 +19649,43 @@
         </p:blipFill>
         <p:spPr>
           <a:xfrm>
-            <a:off x="2956262" y="1040443"/>
+            <a:off x="4966547" y="1058500"/>
+            <a:ext cx="442106" cy="442106"/>
+          </a:xfrm>
+          <a:prstGeom prst="rect">
+            <a:avLst/>
+          </a:prstGeom>
+        </p:spPr>
+      </p:pic>
+      <p:pic>
+        <p:nvPicPr>
+          <p:cNvPr id="56" name="Graphic 55" descr="Checkmark with solid fill">
+            <a:extLst>
+              <a:ext uri="{FF2B5EF4-FFF2-40B4-BE49-F238E27FC236}">
+                <a16:creationId xmlns:a16="http://schemas.microsoft.com/office/drawing/2014/main" id="{CBAA2E96-61AA-57E2-F4D3-8BFCC9E9F2F1}"/>
+              </a:ext>
+            </a:extLst>
+          </p:cNvPr>
+          <p:cNvPicPr>
+            <a:picLocks noChangeAspect="1"/>
+          </p:cNvPicPr>
+          <p:nvPr/>
+        </p:nvPicPr>
+        <p:blipFill>
+          <a:blip r:embed="rId4">
+            <a:extLst>
+              <a:ext uri="{96DAC541-7B7A-43D3-8B79-37D633B846F1}">
+                <asvg:svgBlip xmlns:asvg="http://schemas.microsoft.com/office/drawing/2016/SVG/main" r:embed="rId5"/>
+              </a:ext>
+            </a:extLst>
+          </a:blip>
+          <a:stretch>
+            <a:fillRect/>
+          </a:stretch>
+        </p:blipFill>
+        <p:spPr>
+          <a:xfrm>
+            <a:off x="7203765" y="1016445"/>
             <a:ext cx="442106" cy="442106"/>
           </a:xfrm>
           <a:prstGeom prst="rect">

</xml_diff>

<commit_message>
updated readme and demo notebook
</commit_message>
<xml_diff>
--- a/MaterialReading_etc/CombinedModelFlowcharts.pptx
+++ b/MaterialReading_etc/CombinedModelFlowcharts.pptx
@@ -261,7 +261,7 @@
           <a:p>
             <a:fld id="{5238624F-C034-1A44-92C3-6F2AD22793ED}" type="datetimeFigureOut">
               <a:rPr lang="en-US" smtClean="0"/>
-              <a:t>11/4/24</a:t>
+              <a:t>11/6/24</a:t>
             </a:fld>
             <a:endParaRPr lang="en-US"/>
           </a:p>
@@ -459,7 +459,7 @@
           <a:p>
             <a:fld id="{5238624F-C034-1A44-92C3-6F2AD22793ED}" type="datetimeFigureOut">
               <a:rPr lang="en-US" smtClean="0"/>
-              <a:t>11/4/24</a:t>
+              <a:t>11/6/24</a:t>
             </a:fld>
             <a:endParaRPr lang="en-US"/>
           </a:p>
@@ -667,7 +667,7 @@
           <a:p>
             <a:fld id="{5238624F-C034-1A44-92C3-6F2AD22793ED}" type="datetimeFigureOut">
               <a:rPr lang="en-US" smtClean="0"/>
-              <a:t>11/4/24</a:t>
+              <a:t>11/6/24</a:t>
             </a:fld>
             <a:endParaRPr lang="en-US"/>
           </a:p>
@@ -865,7 +865,7 @@
           <a:p>
             <a:fld id="{5238624F-C034-1A44-92C3-6F2AD22793ED}" type="datetimeFigureOut">
               <a:rPr lang="en-US" smtClean="0"/>
-              <a:t>11/4/24</a:t>
+              <a:t>11/6/24</a:t>
             </a:fld>
             <a:endParaRPr lang="en-US"/>
           </a:p>
@@ -1140,7 +1140,7 @@
           <a:p>
             <a:fld id="{5238624F-C034-1A44-92C3-6F2AD22793ED}" type="datetimeFigureOut">
               <a:rPr lang="en-US" smtClean="0"/>
-              <a:t>11/4/24</a:t>
+              <a:t>11/6/24</a:t>
             </a:fld>
             <a:endParaRPr lang="en-US"/>
           </a:p>
@@ -1405,7 +1405,7 @@
           <a:p>
             <a:fld id="{5238624F-C034-1A44-92C3-6F2AD22793ED}" type="datetimeFigureOut">
               <a:rPr lang="en-US" smtClean="0"/>
-              <a:t>11/4/24</a:t>
+              <a:t>11/6/24</a:t>
             </a:fld>
             <a:endParaRPr lang="en-US"/>
           </a:p>
@@ -1817,7 +1817,7 @@
           <a:p>
             <a:fld id="{5238624F-C034-1A44-92C3-6F2AD22793ED}" type="datetimeFigureOut">
               <a:rPr lang="en-US" smtClean="0"/>
-              <a:t>11/4/24</a:t>
+              <a:t>11/6/24</a:t>
             </a:fld>
             <a:endParaRPr lang="en-US"/>
           </a:p>
@@ -1958,7 +1958,7 @@
           <a:p>
             <a:fld id="{5238624F-C034-1A44-92C3-6F2AD22793ED}" type="datetimeFigureOut">
               <a:rPr lang="en-US" smtClean="0"/>
-              <a:t>11/4/24</a:t>
+              <a:t>11/6/24</a:t>
             </a:fld>
             <a:endParaRPr lang="en-US"/>
           </a:p>
@@ -2071,7 +2071,7 @@
           <a:p>
             <a:fld id="{5238624F-C034-1A44-92C3-6F2AD22793ED}" type="datetimeFigureOut">
               <a:rPr lang="en-US" smtClean="0"/>
-              <a:t>11/4/24</a:t>
+              <a:t>11/6/24</a:t>
             </a:fld>
             <a:endParaRPr lang="en-US"/>
           </a:p>
@@ -2382,7 +2382,7 @@
           <a:p>
             <a:fld id="{5238624F-C034-1A44-92C3-6F2AD22793ED}" type="datetimeFigureOut">
               <a:rPr lang="en-US" smtClean="0"/>
-              <a:t>11/4/24</a:t>
+              <a:t>11/6/24</a:t>
             </a:fld>
             <a:endParaRPr lang="en-US"/>
           </a:p>
@@ -2670,7 +2670,7 @@
           <a:p>
             <a:fld id="{5238624F-C034-1A44-92C3-6F2AD22793ED}" type="datetimeFigureOut">
               <a:rPr lang="en-US" smtClean="0"/>
-              <a:t>11/4/24</a:t>
+              <a:t>11/6/24</a:t>
             </a:fld>
             <a:endParaRPr lang="en-US"/>
           </a:p>
@@ -2911,7 +2911,7 @@
           <a:p>
             <a:fld id="{5238624F-C034-1A44-92C3-6F2AD22793ED}" type="datetimeFigureOut">
               <a:rPr lang="en-US" smtClean="0"/>
-              <a:t>11/4/24</a:t>
+              <a:t>11/6/24</a:t>
             </a:fld>
             <a:endParaRPr lang="en-US"/>
           </a:p>
@@ -3342,8 +3342,8 @@
         </p:nvSpPr>
         <p:spPr>
           <a:xfrm>
-            <a:off x="323188" y="2116596"/>
-            <a:ext cx="11464611" cy="3072014"/>
+            <a:off x="323188" y="2261500"/>
+            <a:ext cx="11464611" cy="2927109"/>
           </a:xfrm>
           <a:prstGeom prst="roundRect">
             <a:avLst/>
@@ -3398,7 +3398,7 @@
         </p:nvSpPr>
         <p:spPr>
           <a:xfrm>
-            <a:off x="635877" y="2521108"/>
+            <a:off x="635877" y="2645800"/>
             <a:ext cx="1671145" cy="2475530"/>
           </a:xfrm>
           <a:prstGeom prst="roundRect">
@@ -3457,7 +3457,7 @@
         </p:nvSpPr>
         <p:spPr>
           <a:xfrm>
-            <a:off x="2843047" y="2521108"/>
+            <a:off x="2843047" y="2645800"/>
             <a:ext cx="1671145" cy="2475529"/>
           </a:xfrm>
           <a:prstGeom prst="roundRect">
@@ -3516,7 +3516,7 @@
         </p:nvSpPr>
         <p:spPr>
           <a:xfrm>
-            <a:off x="5260427" y="2521107"/>
+            <a:off x="5260427" y="2645799"/>
             <a:ext cx="1671145" cy="2475530"/>
           </a:xfrm>
           <a:prstGeom prst="roundRect">
@@ -3575,7 +3575,7 @@
         </p:nvSpPr>
         <p:spPr>
           <a:xfrm>
-            <a:off x="9863955" y="2521107"/>
+            <a:off x="9863955" y="2645799"/>
             <a:ext cx="1671145" cy="2475530"/>
           </a:xfrm>
           <a:prstGeom prst="roundRect">
@@ -3634,7 +3634,7 @@
         </p:nvSpPr>
         <p:spPr>
           <a:xfrm>
-            <a:off x="641133" y="2598789"/>
+            <a:off x="641133" y="2723481"/>
             <a:ext cx="1770994" cy="1546577"/>
           </a:xfrm>
           <a:prstGeom prst="rect">
@@ -3765,7 +3765,7 @@
         </p:nvSpPr>
         <p:spPr>
           <a:xfrm>
-            <a:off x="2885088" y="2577171"/>
+            <a:off x="2885088" y="2701863"/>
             <a:ext cx="1581808" cy="2354491"/>
           </a:xfrm>
           <a:prstGeom prst="rect">
@@ -3860,7 +3860,7 @@
         </p:nvSpPr>
         <p:spPr>
           <a:xfrm>
-            <a:off x="9863955" y="2598945"/>
+            <a:off x="9863955" y="2723637"/>
             <a:ext cx="1770994" cy="1708160"/>
           </a:xfrm>
           <a:prstGeom prst="rect">
@@ -3928,7 +3928,7 @@
         </p:nvSpPr>
         <p:spPr>
           <a:xfrm>
-            <a:off x="5287845" y="2582801"/>
+            <a:off x="5287845" y="2707493"/>
             <a:ext cx="1460935" cy="2031325"/>
           </a:xfrm>
           <a:prstGeom prst="rect">
@@ -3991,7 +3991,7 @@
         </p:nvSpPr>
         <p:spPr>
           <a:xfrm>
-            <a:off x="7567447" y="2521107"/>
+            <a:off x="7567447" y="2645799"/>
             <a:ext cx="1671145" cy="2475530"/>
           </a:xfrm>
           <a:prstGeom prst="roundRect">
@@ -4050,7 +4050,7 @@
         </p:nvSpPr>
         <p:spPr>
           <a:xfrm>
-            <a:off x="7564816" y="2598789"/>
+            <a:off x="7564816" y="2723481"/>
             <a:ext cx="1560785" cy="2031325"/>
           </a:xfrm>
           <a:prstGeom prst="rect">
@@ -4113,7 +4113,7 @@
         </p:nvSpPr>
         <p:spPr>
           <a:xfrm>
-            <a:off x="5260423" y="1401025"/>
+            <a:off x="5260423" y="1317897"/>
             <a:ext cx="1671145" cy="577081"/>
           </a:xfrm>
           <a:prstGeom prst="roundRect">
@@ -4236,7 +4236,7 @@
         <p:spPr>
           <a:xfrm>
             <a:off x="6095995" y="1159928"/>
-            <a:ext cx="1" cy="241097"/>
+            <a:ext cx="1" cy="157969"/>
           </a:xfrm>
           <a:prstGeom prst="straightConnector1">
             <a:avLst/>
@@ -4281,7 +4281,7 @@
         </p:nvCxnSpPr>
         <p:spPr>
           <a:xfrm>
-            <a:off x="2307022" y="3758873"/>
+            <a:off x="2307022" y="3883565"/>
             <a:ext cx="536025" cy="0"/>
           </a:xfrm>
           <a:prstGeom prst="straightConnector1">
@@ -4327,7 +4327,7 @@
         </p:nvCxnSpPr>
         <p:spPr>
           <a:xfrm flipV="1">
-            <a:off x="4514192" y="3758872"/>
+            <a:off x="4514192" y="3883564"/>
             <a:ext cx="746235" cy="1"/>
           </a:xfrm>
           <a:prstGeom prst="straightConnector1">
@@ -4373,7 +4373,7 @@
         </p:nvCxnSpPr>
         <p:spPr>
           <a:xfrm>
-            <a:off x="6931572" y="3758872"/>
+            <a:off x="6931572" y="3883564"/>
             <a:ext cx="635875" cy="0"/>
           </a:xfrm>
           <a:prstGeom prst="straightConnector1">
@@ -4419,7 +4419,7 @@
         </p:nvCxnSpPr>
         <p:spPr>
           <a:xfrm>
-            <a:off x="9238592" y="3758872"/>
+            <a:off x="9238592" y="3883564"/>
             <a:ext cx="625363" cy="0"/>
           </a:xfrm>
           <a:prstGeom prst="straightConnector1">
@@ -4465,8 +4465,8 @@
         </p:nvCxnSpPr>
         <p:spPr>
           <a:xfrm rot="5400000">
-            <a:off x="8599100" y="3329109"/>
-            <a:ext cx="432900" cy="3767956"/>
+            <a:off x="8661446" y="3391455"/>
+            <a:ext cx="308208" cy="3767956"/>
           </a:xfrm>
           <a:prstGeom prst="curvedConnector2">
             <a:avLst/>
@@ -4511,8 +4511,8 @@
         </p:nvCxnSpPr>
         <p:spPr>
           <a:xfrm rot="10800000">
-            <a:off x="1471451" y="4996639"/>
-            <a:ext cx="3788977" cy="432899"/>
+            <a:off x="1471451" y="5121331"/>
+            <a:ext cx="3788977" cy="308207"/>
           </a:xfrm>
           <a:prstGeom prst="curvedConnector2">
             <a:avLst/>
@@ -4598,7 +4598,7 @@
         </p:nvSpPr>
         <p:spPr>
           <a:xfrm>
-            <a:off x="5260423" y="1422990"/>
+            <a:off x="5260423" y="1339862"/>
             <a:ext cx="1671146" cy="577081"/>
           </a:xfrm>
           <a:prstGeom prst="rect">
@@ -4847,8 +4847,8 @@
         </p:nvSpPr>
         <p:spPr>
           <a:xfrm>
-            <a:off x="5169996" y="2145149"/>
-            <a:ext cx="1770994" cy="261610"/>
+            <a:off x="5077747" y="2001088"/>
+            <a:ext cx="2036481" cy="253916"/>
           </a:xfrm>
           <a:prstGeom prst="rect">
             <a:avLst/>
@@ -4863,11 +4863,14 @@
           <a:p>
             <a:pPr algn="ctr"/>
             <a:r>
-              <a:rPr lang="en-US" sz="1050" b="1" dirty="0">
-                <a:latin typeface="Times" pitchFamily="2" charset="0"/>
-              </a:rPr>
-              <a:t>Main model loop</a:t>
-            </a:r>
+              <a:rPr lang="en-US" sz="1050" b="1" dirty="0" err="1">
+                <a:latin typeface="Courier" pitchFamily="2" charset="0"/>
+              </a:rPr>
+              <a:t>WOW.py</a:t>
+            </a:r>
+            <a:endParaRPr lang="en-US" sz="1050" b="1" dirty="0">
+              <a:latin typeface="Courier" pitchFamily="2" charset="0"/>
+            </a:endParaRPr>
           </a:p>
         </p:txBody>
       </p:sp>
@@ -4883,14 +4886,14 @@
           <p:cNvCxnSpPr>
             <a:cxnSpLocks/>
             <a:stCxn id="16" idx="1"/>
-            <a:endCxn id="5" idx="0"/>
+            <a:endCxn id="9" idx="0"/>
           </p:cNvCxnSpPr>
           <p:nvPr/>
         </p:nvCxnSpPr>
         <p:spPr>
           <a:xfrm rot="10800000" flipV="1">
-            <a:off x="1471451" y="1689566"/>
-            <a:ext cx="3788973" cy="831542"/>
+            <a:off x="1526631" y="1606437"/>
+            <a:ext cx="3733793" cy="655061"/>
           </a:xfrm>
           <a:prstGeom prst="curvedConnector2">
             <a:avLst/>
@@ -4917,6 +4920,223 @@
           </a:fontRef>
         </p:style>
       </p:cxnSp>
+      <p:sp>
+        <p:nvSpPr>
+          <p:cNvPr id="13" name="TextBox 12">
+            <a:extLst>
+              <a:ext uri="{FF2B5EF4-FFF2-40B4-BE49-F238E27FC236}">
+                <a16:creationId xmlns:a16="http://schemas.microsoft.com/office/drawing/2014/main" id="{8A2820FA-EC8A-86D1-3480-871E57635CAA}"/>
+              </a:ext>
+            </a:extLst>
+          </p:cNvPr>
+          <p:cNvSpPr txBox="1"/>
+          <p:nvPr/>
+        </p:nvSpPr>
+        <p:spPr>
+          <a:xfrm>
+            <a:off x="582672" y="2389951"/>
+            <a:ext cx="1770994" cy="261610"/>
+          </a:xfrm>
+          <a:prstGeom prst="rect">
+            <a:avLst/>
+          </a:prstGeom>
+          <a:noFill/>
+        </p:spPr>
+        <p:txBody>
+          <a:bodyPr wrap="square" rtlCol="0">
+            <a:spAutoFit/>
+          </a:bodyPr>
+          <a:lstStyle/>
+          <a:p>
+            <a:pPr algn="ctr"/>
+            <a:r>
+              <a:rPr lang="en-US" sz="1050" b="1" dirty="0" err="1">
+                <a:latin typeface="Courier" pitchFamily="2" charset="0"/>
+              </a:rPr>
+              <a:t>decay.py</a:t>
+            </a:r>
+            <a:endParaRPr lang="en-US" sz="1050" b="1" dirty="0">
+              <a:latin typeface="Courier" pitchFamily="2" charset="0"/>
+            </a:endParaRPr>
+          </a:p>
+        </p:txBody>
+      </p:sp>
+      <p:sp>
+        <p:nvSpPr>
+          <p:cNvPr id="18" name="TextBox 17">
+            <a:extLst>
+              <a:ext uri="{FF2B5EF4-FFF2-40B4-BE49-F238E27FC236}">
+                <a16:creationId xmlns:a16="http://schemas.microsoft.com/office/drawing/2014/main" id="{5BB67150-85E4-EA9B-83D8-E8CA28FA53EA}"/>
+              </a:ext>
+            </a:extLst>
+          </p:cNvPr>
+          <p:cNvSpPr txBox="1"/>
+          <p:nvPr/>
+        </p:nvSpPr>
+        <p:spPr>
+          <a:xfrm>
+            <a:off x="2790495" y="2250116"/>
+            <a:ext cx="1770994" cy="415498"/>
+          </a:xfrm>
+          <a:prstGeom prst="rect">
+            <a:avLst/>
+          </a:prstGeom>
+          <a:noFill/>
+        </p:spPr>
+        <p:txBody>
+          <a:bodyPr wrap="square" rtlCol="0">
+            <a:spAutoFit/>
+          </a:bodyPr>
+          <a:lstStyle/>
+          <a:p>
+            <a:pPr algn="ctr"/>
+            <a:r>
+              <a:rPr lang="en-US" sz="1050" b="1" dirty="0" err="1">
+                <a:latin typeface="Courier" pitchFamily="2" charset="0"/>
+              </a:rPr>
+              <a:t>rockEquil.py</a:t>
+            </a:r>
+            <a:endParaRPr lang="en-US" sz="1050" b="1" dirty="0">
+              <a:latin typeface="Courier" pitchFamily="2" charset="0"/>
+            </a:endParaRPr>
+          </a:p>
+          <a:p>
+            <a:pPr algn="ctr"/>
+            <a:r>
+              <a:rPr lang="en-US" sz="1050" b="1" dirty="0" err="1">
+                <a:latin typeface="Courier" pitchFamily="2" charset="0"/>
+              </a:rPr>
+              <a:t>aqStep.py</a:t>
+            </a:r>
+            <a:endParaRPr lang="en-US" sz="1050" b="1" dirty="0">
+              <a:latin typeface="Courier" pitchFamily="2" charset="0"/>
+            </a:endParaRPr>
+          </a:p>
+        </p:txBody>
+      </p:sp>
+      <p:sp>
+        <p:nvSpPr>
+          <p:cNvPr id="20" name="TextBox 19">
+            <a:extLst>
+              <a:ext uri="{FF2B5EF4-FFF2-40B4-BE49-F238E27FC236}">
+                <a16:creationId xmlns:a16="http://schemas.microsoft.com/office/drawing/2014/main" id="{485DA970-2B2D-75B6-1DDD-B8BC713C1AC7}"/>
+              </a:ext>
+            </a:extLst>
+          </p:cNvPr>
+          <p:cNvSpPr txBox="1"/>
+          <p:nvPr/>
+        </p:nvSpPr>
+        <p:spPr>
+          <a:xfrm>
+            <a:off x="5210499" y="2400870"/>
+            <a:ext cx="1770994" cy="253916"/>
+          </a:xfrm>
+          <a:prstGeom prst="rect">
+            <a:avLst/>
+          </a:prstGeom>
+          <a:noFill/>
+        </p:spPr>
+        <p:txBody>
+          <a:bodyPr wrap="square" rtlCol="0">
+            <a:spAutoFit/>
+          </a:bodyPr>
+          <a:lstStyle/>
+          <a:p>
+            <a:pPr algn="ctr"/>
+            <a:r>
+              <a:rPr lang="en-US" sz="1050" b="1" dirty="0" err="1">
+                <a:latin typeface="Courier" pitchFamily="2" charset="0"/>
+              </a:rPr>
+              <a:t>matTrans.py</a:t>
+            </a:r>
+            <a:endParaRPr lang="en-US" sz="1050" b="1" dirty="0">
+              <a:latin typeface="Courier" pitchFamily="2" charset="0"/>
+            </a:endParaRPr>
+          </a:p>
+        </p:txBody>
+      </p:sp>
+      <p:sp>
+        <p:nvSpPr>
+          <p:cNvPr id="21" name="TextBox 20">
+            <a:extLst>
+              <a:ext uri="{FF2B5EF4-FFF2-40B4-BE49-F238E27FC236}">
+                <a16:creationId xmlns:a16="http://schemas.microsoft.com/office/drawing/2014/main" id="{AFC7801B-9CDC-BA6A-B204-C218E360E2D9}"/>
+              </a:ext>
+            </a:extLst>
+          </p:cNvPr>
+          <p:cNvSpPr txBox="1"/>
+          <p:nvPr/>
+        </p:nvSpPr>
+        <p:spPr>
+          <a:xfrm>
+            <a:off x="7517522" y="2396591"/>
+            <a:ext cx="1770994" cy="253916"/>
+          </a:xfrm>
+          <a:prstGeom prst="rect">
+            <a:avLst/>
+          </a:prstGeom>
+          <a:noFill/>
+        </p:spPr>
+        <p:txBody>
+          <a:bodyPr wrap="square" rtlCol="0">
+            <a:spAutoFit/>
+          </a:bodyPr>
+          <a:lstStyle/>
+          <a:p>
+            <a:pPr algn="ctr"/>
+            <a:r>
+              <a:rPr lang="en-US" sz="1050" b="1" dirty="0" err="1">
+                <a:latin typeface="Courier" pitchFamily="2" charset="0"/>
+              </a:rPr>
+              <a:t>lookupProps.py</a:t>
+            </a:r>
+            <a:endParaRPr lang="en-US" sz="1050" b="1" dirty="0">
+              <a:latin typeface="Courier" pitchFamily="2" charset="0"/>
+            </a:endParaRPr>
+          </a:p>
+        </p:txBody>
+      </p:sp>
+      <p:sp>
+        <p:nvSpPr>
+          <p:cNvPr id="22" name="TextBox 21">
+            <a:extLst>
+              <a:ext uri="{FF2B5EF4-FFF2-40B4-BE49-F238E27FC236}">
+                <a16:creationId xmlns:a16="http://schemas.microsoft.com/office/drawing/2014/main" id="{FA1A7475-6EEE-AF49-7FEA-1FEC713007C6}"/>
+              </a:ext>
+            </a:extLst>
+          </p:cNvPr>
+          <p:cNvSpPr txBox="1"/>
+          <p:nvPr/>
+        </p:nvSpPr>
+        <p:spPr>
+          <a:xfrm>
+            <a:off x="9838334" y="2403818"/>
+            <a:ext cx="1770994" cy="253916"/>
+          </a:xfrm>
+          <a:prstGeom prst="rect">
+            <a:avLst/>
+          </a:prstGeom>
+          <a:noFill/>
+        </p:spPr>
+        <p:txBody>
+          <a:bodyPr wrap="square" rtlCol="0">
+            <a:spAutoFit/>
+          </a:bodyPr>
+          <a:lstStyle/>
+          <a:p>
+            <a:pPr algn="ctr"/>
+            <a:r>
+              <a:rPr lang="en-US" sz="1050" b="1" dirty="0" err="1">
+                <a:latin typeface="Courier" pitchFamily="2" charset="0"/>
+              </a:rPr>
+              <a:t>thermalConduction.py</a:t>
+            </a:r>
+            <a:endParaRPr lang="en-US" sz="1050" b="1" dirty="0">
+              <a:latin typeface="Courier" pitchFamily="2" charset="0"/>
+            </a:endParaRPr>
+          </a:p>
+        </p:txBody>
+      </p:sp>
     </p:spTree>
     <p:extLst>
       <p:ext uri="{BB962C8B-B14F-4D97-AF65-F5344CB8AC3E}">
@@ -4975,7 +5195,7 @@
           <a:p>
             <a:r>
               <a:rPr lang="en-US" dirty="0"/>
-              <a:t>Code architecture:</a:t>
+              <a:t>Simplified code architecture:</a:t>
             </a:r>
           </a:p>
         </p:txBody>
@@ -4994,7 +5214,7 @@
         </p:nvSpPr>
         <p:spPr>
           <a:xfrm>
-            <a:off x="5735785" y="5039592"/>
+            <a:off x="5060373" y="5039592"/>
             <a:ext cx="259772" cy="249382"/>
           </a:xfrm>
           <a:prstGeom prst="rect">
@@ -5050,7 +5270,7 @@
         </p:nvSpPr>
         <p:spPr>
           <a:xfrm>
-            <a:off x="5735785" y="4790210"/>
+            <a:off x="5060373" y="4790210"/>
             <a:ext cx="259772" cy="249382"/>
           </a:xfrm>
           <a:prstGeom prst="rect">
@@ -5106,7 +5326,7 @@
         </p:nvSpPr>
         <p:spPr>
           <a:xfrm>
-            <a:off x="5735785" y="4540828"/>
+            <a:off x="5060373" y="4540828"/>
             <a:ext cx="259772" cy="249382"/>
           </a:xfrm>
           <a:prstGeom prst="rect">
@@ -5162,7 +5382,7 @@
         </p:nvSpPr>
         <p:spPr>
           <a:xfrm>
-            <a:off x="5735785" y="4291446"/>
+            <a:off x="5060373" y="4291446"/>
             <a:ext cx="259772" cy="249382"/>
           </a:xfrm>
           <a:prstGeom prst="rect">
@@ -5218,7 +5438,7 @@
         </p:nvSpPr>
         <p:spPr>
           <a:xfrm>
-            <a:off x="5735785" y="4042064"/>
+            <a:off x="5060373" y="4042064"/>
             <a:ext cx="259772" cy="249382"/>
           </a:xfrm>
           <a:prstGeom prst="rect">
@@ -5274,7 +5494,7 @@
         </p:nvSpPr>
         <p:spPr>
           <a:xfrm>
-            <a:off x="5735785" y="3792682"/>
+            <a:off x="5060373" y="3792682"/>
             <a:ext cx="259772" cy="249382"/>
           </a:xfrm>
           <a:prstGeom prst="rect">
@@ -5330,7 +5550,7 @@
         </p:nvSpPr>
         <p:spPr>
           <a:xfrm>
-            <a:off x="5735785" y="3553691"/>
+            <a:off x="5060373" y="3553691"/>
             <a:ext cx="259772" cy="249382"/>
           </a:xfrm>
           <a:prstGeom prst="rect">
@@ -5386,7 +5606,7 @@
         </p:nvSpPr>
         <p:spPr>
           <a:xfrm>
-            <a:off x="5735785" y="3304309"/>
+            <a:off x="5060373" y="3304309"/>
             <a:ext cx="259772" cy="249382"/>
           </a:xfrm>
           <a:prstGeom prst="rect">
@@ -5442,7 +5662,7 @@
         </p:nvSpPr>
         <p:spPr>
           <a:xfrm>
-            <a:off x="5735785" y="3054927"/>
+            <a:off x="5060373" y="3054927"/>
             <a:ext cx="259772" cy="249382"/>
           </a:xfrm>
           <a:prstGeom prst="rect">
@@ -5498,7 +5718,7 @@
         </p:nvSpPr>
         <p:spPr>
           <a:xfrm>
-            <a:off x="5735785" y="2805545"/>
+            <a:off x="5060373" y="2805545"/>
             <a:ext cx="259772" cy="249382"/>
           </a:xfrm>
           <a:prstGeom prst="rect">
@@ -5554,7 +5774,7 @@
         </p:nvSpPr>
         <p:spPr>
           <a:xfrm>
-            <a:off x="5735785" y="2556163"/>
+            <a:off x="5060373" y="2556163"/>
             <a:ext cx="259772" cy="249382"/>
           </a:xfrm>
           <a:prstGeom prst="rect">
@@ -5610,7 +5830,7 @@
         </p:nvSpPr>
         <p:spPr>
           <a:xfrm>
-            <a:off x="5735785" y="2296389"/>
+            <a:off x="5060373" y="2296389"/>
             <a:ext cx="259772" cy="249382"/>
           </a:xfrm>
           <a:prstGeom prst="rect">
@@ -5666,7 +5886,7 @@
         </p:nvSpPr>
         <p:spPr>
           <a:xfrm>
-            <a:off x="5735785" y="2036613"/>
+            <a:off x="5060373" y="2036613"/>
             <a:ext cx="259772" cy="249382"/>
           </a:xfrm>
           <a:prstGeom prst="rect">
@@ -5722,7 +5942,7 @@
         </p:nvSpPr>
         <p:spPr>
           <a:xfrm>
-            <a:off x="5735785" y="5288974"/>
+            <a:off x="5060373" y="5288974"/>
             <a:ext cx="259772" cy="249382"/>
           </a:xfrm>
           <a:prstGeom prst="rect">
@@ -5781,7 +6001,7 @@
         <p:spPr>
           <a:xfrm>
             <a:off x="3209047" y="3151999"/>
-            <a:ext cx="2490374" cy="2386357"/>
+            <a:ext cx="1840503" cy="2386357"/>
           </a:xfrm>
           <a:prstGeom prst="line">
             <a:avLst/>
@@ -5823,8 +6043,8 @@
         </p:nvCxnSpPr>
         <p:spPr>
           <a:xfrm flipV="1">
-            <a:off x="3209048" y="2007625"/>
-            <a:ext cx="2526736" cy="1144374"/>
+            <a:off x="3209048" y="2029439"/>
+            <a:ext cx="1840502" cy="1122560"/>
           </a:xfrm>
           <a:prstGeom prst="line">
             <a:avLst/>
@@ -5864,7 +6084,7 @@
         </p:nvSpPr>
         <p:spPr>
           <a:xfrm>
-            <a:off x="5182351" y="5357721"/>
+            <a:off x="4506939" y="5357721"/>
             <a:ext cx="1932695" cy="276999"/>
           </a:xfrm>
           <a:prstGeom prst="rect">
@@ -5902,7 +6122,7 @@
         </p:nvSpPr>
         <p:spPr>
           <a:xfrm>
-            <a:off x="5001015" y="1871325"/>
+            <a:off x="4325603" y="1871325"/>
             <a:ext cx="1932695" cy="276999"/>
           </a:xfrm>
           <a:prstGeom prst="rect">
@@ -5941,7 +6161,7 @@
         <p:spPr>
           <a:xfrm>
             <a:off x="760209" y="1736227"/>
-            <a:ext cx="3235341" cy="3385542"/>
+            <a:ext cx="3235341" cy="3539430"/>
           </a:xfrm>
           <a:prstGeom prst="rect">
             <a:avLst/>
@@ -5976,7 +6196,7 @@
               <a:rPr lang="en-US" sz="1600" b="1" dirty="0">
                 <a:latin typeface="Courier" pitchFamily="2" charset="0"/>
               </a:rPr>
-              <a:t>Attributes</a:t>
+              <a:t>Key Attributes</a:t>
             </a:r>
           </a:p>
           <a:p>
@@ -6013,47 +6233,91 @@
               <a:rPr lang="en-US" sz="1600" b="1" dirty="0">
                 <a:latin typeface="Courier" pitchFamily="2" charset="0"/>
               </a:rPr>
-              <a:t>Functions</a:t>
-            </a:r>
-          </a:p>
-          <a:p>
+              <a:t>Key Functions</a:t>
+            </a:r>
+          </a:p>
+          <a:p>
+            <a:r>
+              <a:rPr lang="en-US" sz="1600" dirty="0" err="1">
+                <a:latin typeface="Courier" pitchFamily="2" charset="0"/>
+              </a:rPr>
+              <a:t>initialize_comp</a:t>
+            </a:r>
             <a:r>
               <a:rPr lang="en-US" sz="1600" dirty="0">
                 <a:latin typeface="Courier" pitchFamily="2" charset="0"/>
               </a:rPr>
-              <a:t>Time_step()</a:t>
-            </a:r>
-          </a:p>
-          <a:p>
+              <a:t>()</a:t>
+            </a:r>
+          </a:p>
+          <a:p>
+            <a:r>
+              <a:rPr lang="en-US" sz="1600" dirty="0" err="1">
+                <a:latin typeface="Courier" pitchFamily="2" charset="0"/>
+              </a:rPr>
+              <a:t>runModel</a:t>
+            </a:r>
             <a:r>
               <a:rPr lang="en-US" sz="1600" dirty="0">
                 <a:latin typeface="Courier" pitchFamily="2" charset="0"/>
               </a:rPr>
-              <a:t>Heat_Transport()</a:t>
-            </a:r>
-          </a:p>
-          <a:p>
+              <a:t>()</a:t>
+            </a:r>
+          </a:p>
+          <a:p>
+            <a:r>
+              <a:rPr lang="en-US" sz="1600" dirty="0" err="1">
+                <a:latin typeface="Courier" pitchFamily="2" charset="0"/>
+              </a:rPr>
+              <a:t>timeStep</a:t>
+            </a:r>
             <a:r>
               <a:rPr lang="en-US" sz="1600" dirty="0">
                 <a:latin typeface="Courier" pitchFamily="2" charset="0"/>
               </a:rPr>
-              <a:t>Material_Transport()</a:t>
-            </a:r>
-          </a:p>
-          <a:p>
+              <a:t>()</a:t>
+            </a:r>
+          </a:p>
+          <a:p>
+            <a:r>
+              <a:rPr lang="en-US" sz="1600" dirty="0" err="1">
+                <a:latin typeface="Courier" pitchFamily="2" charset="0"/>
+              </a:rPr>
+              <a:t>transferHeat</a:t>
+            </a:r>
             <a:r>
               <a:rPr lang="en-US" sz="1600" dirty="0">
                 <a:latin typeface="Courier" pitchFamily="2" charset="0"/>
               </a:rPr>
-              <a:t>Update_bulk()</a:t>
-            </a:r>
-          </a:p>
-          <a:p>
+              <a:t>()</a:t>
+            </a:r>
+          </a:p>
+          <a:p>
+            <a:r>
+              <a:rPr lang="en-US" sz="1600" dirty="0" err="1">
+                <a:latin typeface="Courier" pitchFamily="2" charset="0"/>
+              </a:rPr>
+              <a:t>transportMaterial</a:t>
+            </a:r>
             <a:r>
               <a:rPr lang="en-US" sz="1600" dirty="0">
                 <a:latin typeface="Courier" pitchFamily="2" charset="0"/>
               </a:rPr>
-              <a:t>Initialize()</a:t>
+              <a:t>()</a:t>
+            </a:r>
+          </a:p>
+          <a:p>
+            <a:r>
+              <a:rPr lang="en-US" sz="1600" dirty="0" err="1">
+                <a:latin typeface="Courier" pitchFamily="2" charset="0"/>
+              </a:rPr>
+              <a:t>updateBulk</a:t>
+            </a:r>
+            <a:r>
+              <a:rPr lang="en-US" sz="1600" dirty="0">
+                <a:latin typeface="Courier" pitchFamily="2" charset="0"/>
+              </a:rPr>
+              <a:t>()</a:t>
             </a:r>
           </a:p>
         </p:txBody>
@@ -6072,8 +6336,8 @@
         </p:nvSpPr>
         <p:spPr>
           <a:xfrm>
-            <a:off x="7537766" y="1628505"/>
-            <a:ext cx="1932694" cy="3600986"/>
+            <a:off x="6687433" y="1680460"/>
+            <a:ext cx="2223057" cy="4339650"/>
           </a:xfrm>
           <a:prstGeom prst="rect">
             <a:avLst/>
@@ -6108,7 +6372,7 @@
               <a:rPr lang="en-US" sz="1200" b="1" dirty="0">
                 <a:latin typeface="Courier" pitchFamily="2" charset="0"/>
               </a:rPr>
-              <a:t>Attributes</a:t>
+              <a:t>Key Attributes</a:t>
             </a:r>
           </a:p>
           <a:p>
@@ -6116,7 +6380,7 @@
               <a:rPr lang="en-US" sz="1200" dirty="0">
                 <a:latin typeface="Courier" pitchFamily="2" charset="0"/>
               </a:rPr>
-              <a:t>Temp</a:t>
+              <a:t>Temp – Temperature</a:t>
             </a:r>
           </a:p>
           <a:p>
@@ -6124,7 +6388,7 @@
               <a:rPr lang="en-US" sz="1200" dirty="0">
                 <a:latin typeface="Courier" pitchFamily="2" charset="0"/>
               </a:rPr>
-              <a:t>Press</a:t>
+              <a:t>Press - Pressure</a:t>
             </a:r>
           </a:p>
           <a:p>
@@ -6132,15 +6396,21 @@
               <a:rPr lang="en-US" sz="1200" dirty="0">
                 <a:latin typeface="Courier" pitchFamily="2" charset="0"/>
               </a:rPr>
-              <a:t>Location</a:t>
-            </a:r>
-          </a:p>
-          <a:p>
+              <a:t>Top – Radius</a:t>
+            </a:r>
+          </a:p>
+          <a:p>
+            <a:r>
+              <a:rPr lang="en-US" sz="1200" dirty="0" err="1">
+                <a:latin typeface="Courier" pitchFamily="2" charset="0"/>
+              </a:rPr>
+              <a:t>AqComp</a:t>
+            </a:r>
             <a:r>
               <a:rPr lang="en-US" sz="1200" dirty="0">
                 <a:latin typeface="Courier" pitchFamily="2" charset="0"/>
               </a:rPr>
-              <a:t>Aqcomp = dict()</a:t>
+              <a:t> – fluid</a:t>
             </a:r>
           </a:p>
           <a:p>
@@ -6148,15 +6418,21 @@
               <a:rPr lang="en-US" sz="1200" dirty="0">
                 <a:latin typeface="Courier" pitchFamily="2" charset="0"/>
               </a:rPr>
-              <a:t>Rock_comp =dict()</a:t>
-            </a:r>
-          </a:p>
-          <a:p>
+              <a:t>         composition</a:t>
+            </a:r>
+          </a:p>
+          <a:p>
+            <a:r>
+              <a:rPr lang="en-US" sz="1200" dirty="0" err="1">
+                <a:latin typeface="Courier" pitchFamily="2" charset="0"/>
+              </a:rPr>
+              <a:t>RockComp</a:t>
+            </a:r>
             <a:r>
               <a:rPr lang="en-US" sz="1200" dirty="0">
                 <a:latin typeface="Courier" pitchFamily="2" charset="0"/>
               </a:rPr>
-              <a:t>Ice_comp =dict()</a:t>
+              <a:t> – rock</a:t>
             </a:r>
           </a:p>
           <a:p>
@@ -6164,23 +6440,35 @@
               <a:rPr lang="en-US" sz="1200" dirty="0">
                 <a:latin typeface="Courier" pitchFamily="2" charset="0"/>
               </a:rPr>
-              <a:t>Isotopes = dict()</a:t>
-            </a:r>
-          </a:p>
-          <a:p>
+              <a:t>           composition</a:t>
+            </a:r>
+          </a:p>
+          <a:p>
+            <a:r>
+              <a:rPr lang="en-US" sz="1200" dirty="0" err="1">
+                <a:latin typeface="Courier" pitchFamily="2" charset="0"/>
+              </a:rPr>
+              <a:t>IceComp</a:t>
+            </a:r>
             <a:r>
               <a:rPr lang="en-US" sz="1200" dirty="0">
                 <a:latin typeface="Courier" pitchFamily="2" charset="0"/>
               </a:rPr>
-              <a:t>Dens</a:t>
-            </a:r>
-          </a:p>
-          <a:p>
+              <a:t> – ice 	composition</a:t>
+            </a:r>
+          </a:p>
+          <a:p>
+            <a:r>
+              <a:rPr lang="en-US" sz="1200" dirty="0" err="1">
+                <a:latin typeface="Courier" pitchFamily="2" charset="0"/>
+              </a:rPr>
+              <a:t>RIComp</a:t>
+            </a:r>
             <a:r>
               <a:rPr lang="en-US" sz="1200" dirty="0">
                 <a:latin typeface="Courier" pitchFamily="2" charset="0"/>
               </a:rPr>
-              <a:t>K</a:t>
+              <a:t> – radioisotope  </a:t>
             </a:r>
           </a:p>
           <a:p>
@@ -6188,7 +6476,7 @@
               <a:rPr lang="en-US" sz="1200" dirty="0">
                 <a:latin typeface="Courier" pitchFamily="2" charset="0"/>
               </a:rPr>
-              <a:t>Cp</a:t>
+              <a:t>         abundances</a:t>
             </a:r>
           </a:p>
           <a:p>
@@ -6196,7 +6484,37 @@
               <a:rPr lang="en-US" sz="1200" dirty="0">
                 <a:latin typeface="Courier" pitchFamily="2" charset="0"/>
               </a:rPr>
-              <a:t>Etc.</a:t>
+              <a:t>dens - Density</a:t>
+            </a:r>
+          </a:p>
+          <a:p>
+            <a:r>
+              <a:rPr lang="en-US" sz="1200" dirty="0" err="1">
+                <a:latin typeface="Courier" pitchFamily="2" charset="0"/>
+              </a:rPr>
+              <a:t>Tcond</a:t>
+            </a:r>
+            <a:r>
+              <a:rPr lang="en-US" sz="1200" dirty="0">
+                <a:latin typeface="Courier" pitchFamily="2" charset="0"/>
+              </a:rPr>
+              <a:t> – thermal       </a:t>
+            </a:r>
+          </a:p>
+          <a:p>
+            <a:r>
+              <a:rPr lang="en-US" sz="1200" dirty="0">
+                <a:latin typeface="Courier" pitchFamily="2" charset="0"/>
+              </a:rPr>
+              <a:t>        conductivity</a:t>
+            </a:r>
+          </a:p>
+          <a:p>
+            <a:r>
+              <a:rPr lang="en-US" sz="1200" dirty="0">
+                <a:latin typeface="Courier" pitchFamily="2" charset="0"/>
+              </a:rPr>
+              <a:t>Cp – heat capacity</a:t>
             </a:r>
           </a:p>
           <a:p>
@@ -6209,34 +6527,52 @@
               <a:rPr lang="en-US" sz="1200" b="1" dirty="0">
                 <a:latin typeface="Courier" pitchFamily="2" charset="0"/>
               </a:rPr>
-              <a:t>Functions</a:t>
+              <a:t>Key Functions</a:t>
             </a:r>
           </a:p>
           <a:p>
             <a:pPr algn="r"/>
+            <a:r>
+              <a:rPr lang="en-US" sz="1200" dirty="0" err="1">
+                <a:latin typeface="Courier" pitchFamily="2" charset="0"/>
+              </a:rPr>
+              <a:t>cell_heat</a:t>
+            </a:r>
             <a:r>
               <a:rPr lang="en-US" sz="1200" dirty="0">
                 <a:latin typeface="Courier" pitchFamily="2" charset="0"/>
               </a:rPr>
-              <a:t>Heat()</a:t>
+              <a:t>()</a:t>
             </a:r>
           </a:p>
           <a:p>
             <a:pPr algn="r"/>
+            <a:r>
+              <a:rPr lang="en-US" sz="1200" dirty="0" err="1">
+                <a:latin typeface="Courier" pitchFamily="2" charset="0"/>
+              </a:rPr>
+              <a:t>cell_equilibrate</a:t>
+            </a:r>
             <a:r>
               <a:rPr lang="en-US" sz="1200" dirty="0">
                 <a:latin typeface="Courier" pitchFamily="2" charset="0"/>
               </a:rPr>
-              <a:t>Equilibrate()</a:t>
+              <a:t>()</a:t>
             </a:r>
           </a:p>
           <a:p>
             <a:pPr algn="r"/>
+            <a:r>
+              <a:rPr lang="en-US" sz="1200" dirty="0" err="1">
+                <a:latin typeface="Courier" pitchFamily="2" charset="0"/>
+              </a:rPr>
+              <a:t>cell_update_props</a:t>
+            </a:r>
             <a:r>
               <a:rPr lang="en-US" sz="1200" dirty="0">
                 <a:latin typeface="Courier" pitchFamily="2" charset="0"/>
               </a:rPr>
-              <a:t>Update_properties()</a:t>
+              <a:t>()</a:t>
             </a:r>
           </a:p>
         </p:txBody>
@@ -6255,7 +6591,7 @@
         </p:nvSpPr>
         <p:spPr>
           <a:xfrm>
-            <a:off x="6018813" y="5041270"/>
+            <a:off x="5343401" y="5041270"/>
             <a:ext cx="259772" cy="249382"/>
           </a:xfrm>
           <a:prstGeom prst="rect">
@@ -6311,7 +6647,7 @@
         </p:nvSpPr>
         <p:spPr>
           <a:xfrm>
-            <a:off x="6018813" y="4791888"/>
+            <a:off x="5343401" y="4791888"/>
             <a:ext cx="259772" cy="249382"/>
           </a:xfrm>
           <a:prstGeom prst="rect">
@@ -6367,7 +6703,7 @@
         </p:nvSpPr>
         <p:spPr>
           <a:xfrm>
-            <a:off x="6018813" y="4542506"/>
+            <a:off x="5343401" y="4542506"/>
             <a:ext cx="259772" cy="249382"/>
           </a:xfrm>
           <a:prstGeom prst="rect">
@@ -6423,7 +6759,7 @@
         </p:nvSpPr>
         <p:spPr>
           <a:xfrm>
-            <a:off x="6018813" y="4293124"/>
+            <a:off x="5343401" y="4293124"/>
             <a:ext cx="259772" cy="249382"/>
           </a:xfrm>
           <a:prstGeom prst="rect">
@@ -6479,7 +6815,7 @@
         </p:nvSpPr>
         <p:spPr>
           <a:xfrm>
-            <a:off x="6018813" y="4043742"/>
+            <a:off x="5343401" y="4043742"/>
             <a:ext cx="259772" cy="249382"/>
           </a:xfrm>
           <a:prstGeom prst="rect">
@@ -6535,7 +6871,7 @@
         </p:nvSpPr>
         <p:spPr>
           <a:xfrm>
-            <a:off x="6018813" y="3794360"/>
+            <a:off x="5343401" y="3794360"/>
             <a:ext cx="259772" cy="249382"/>
           </a:xfrm>
           <a:prstGeom prst="rect">
@@ -6591,7 +6927,7 @@
         </p:nvSpPr>
         <p:spPr>
           <a:xfrm>
-            <a:off x="6018813" y="3555369"/>
+            <a:off x="5343401" y="3555369"/>
             <a:ext cx="259772" cy="249382"/>
           </a:xfrm>
           <a:prstGeom prst="rect">
@@ -6647,7 +6983,7 @@
         </p:nvSpPr>
         <p:spPr>
           <a:xfrm>
-            <a:off x="6018813" y="3305987"/>
+            <a:off x="5343401" y="3305987"/>
             <a:ext cx="259772" cy="249382"/>
           </a:xfrm>
           <a:prstGeom prst="rect">
@@ -6703,7 +7039,7 @@
         </p:nvSpPr>
         <p:spPr>
           <a:xfrm>
-            <a:off x="6018813" y="3056605"/>
+            <a:off x="5343401" y="3056605"/>
             <a:ext cx="259772" cy="249382"/>
           </a:xfrm>
           <a:prstGeom prst="rect">
@@ -6759,7 +7095,7 @@
         </p:nvSpPr>
         <p:spPr>
           <a:xfrm>
-            <a:off x="6018813" y="2807223"/>
+            <a:off x="5343401" y="2807223"/>
             <a:ext cx="259772" cy="249382"/>
           </a:xfrm>
           <a:prstGeom prst="rect">
@@ -6815,7 +7151,7 @@
         </p:nvSpPr>
         <p:spPr>
           <a:xfrm>
-            <a:off x="6018813" y="2557841"/>
+            <a:off x="5343401" y="2557841"/>
             <a:ext cx="259772" cy="249382"/>
           </a:xfrm>
           <a:prstGeom prst="rect">
@@ -6871,7 +7207,7 @@
         </p:nvSpPr>
         <p:spPr>
           <a:xfrm>
-            <a:off x="6018813" y="2298067"/>
+            <a:off x="5343401" y="2298067"/>
             <a:ext cx="259772" cy="249382"/>
           </a:xfrm>
           <a:prstGeom prst="rect">
@@ -6927,7 +7263,7 @@
         </p:nvSpPr>
         <p:spPr>
           <a:xfrm>
-            <a:off x="6018813" y="2038291"/>
+            <a:off x="5343401" y="2038291"/>
             <a:ext cx="259772" cy="249382"/>
           </a:xfrm>
           <a:prstGeom prst="rect">
@@ -6983,7 +7319,7 @@
         </p:nvSpPr>
         <p:spPr>
           <a:xfrm>
-            <a:off x="6018813" y="5290652"/>
+            <a:off x="5343401" y="5290652"/>
             <a:ext cx="259772" cy="249382"/>
           </a:xfrm>
           <a:prstGeom prst="rect">
@@ -7039,7 +7375,7 @@
         </p:nvSpPr>
         <p:spPr>
           <a:xfrm>
-            <a:off x="6290118" y="5041270"/>
+            <a:off x="5614706" y="5041270"/>
             <a:ext cx="259772" cy="249382"/>
           </a:xfrm>
           <a:prstGeom prst="rect">
@@ -7095,7 +7431,7 @@
         </p:nvSpPr>
         <p:spPr>
           <a:xfrm>
-            <a:off x="6290118" y="4791888"/>
+            <a:off x="5614706" y="4791888"/>
             <a:ext cx="259772" cy="249382"/>
           </a:xfrm>
           <a:prstGeom prst="rect">
@@ -7151,7 +7487,7 @@
         </p:nvSpPr>
         <p:spPr>
           <a:xfrm>
-            <a:off x="6290118" y="4542506"/>
+            <a:off x="5614706" y="4542506"/>
             <a:ext cx="259772" cy="249382"/>
           </a:xfrm>
           <a:prstGeom prst="rect">
@@ -7207,7 +7543,7 @@
         </p:nvSpPr>
         <p:spPr>
           <a:xfrm>
-            <a:off x="6290118" y="4293124"/>
+            <a:off x="5614706" y="4293124"/>
             <a:ext cx="259772" cy="249382"/>
           </a:xfrm>
           <a:prstGeom prst="rect">
@@ -7263,7 +7599,7 @@
         </p:nvSpPr>
         <p:spPr>
           <a:xfrm>
-            <a:off x="6290118" y="4043742"/>
+            <a:off x="5614706" y="4043742"/>
             <a:ext cx="259772" cy="249382"/>
           </a:xfrm>
           <a:prstGeom prst="rect">
@@ -7319,7 +7655,7 @@
         </p:nvSpPr>
         <p:spPr>
           <a:xfrm>
-            <a:off x="6290118" y="3794360"/>
+            <a:off x="5614706" y="3794360"/>
             <a:ext cx="259772" cy="249382"/>
           </a:xfrm>
           <a:prstGeom prst="rect">
@@ -7375,7 +7711,7 @@
         </p:nvSpPr>
         <p:spPr>
           <a:xfrm>
-            <a:off x="6290118" y="3555369"/>
+            <a:off x="5614706" y="3555369"/>
             <a:ext cx="259772" cy="249382"/>
           </a:xfrm>
           <a:prstGeom prst="rect">
@@ -7431,7 +7767,7 @@
         </p:nvSpPr>
         <p:spPr>
           <a:xfrm>
-            <a:off x="6290118" y="3305987"/>
+            <a:off x="5614706" y="3305987"/>
             <a:ext cx="259772" cy="249382"/>
           </a:xfrm>
           <a:prstGeom prst="rect">
@@ -7487,7 +7823,7 @@
         </p:nvSpPr>
         <p:spPr>
           <a:xfrm>
-            <a:off x="6290118" y="3056605"/>
+            <a:off x="5614706" y="3056605"/>
             <a:ext cx="259772" cy="249382"/>
           </a:xfrm>
           <a:prstGeom prst="rect">
@@ -7543,7 +7879,7 @@
         </p:nvSpPr>
         <p:spPr>
           <a:xfrm>
-            <a:off x="6290118" y="2807223"/>
+            <a:off x="5614706" y="2807223"/>
             <a:ext cx="259772" cy="249382"/>
           </a:xfrm>
           <a:prstGeom prst="rect">
@@ -7599,7 +7935,7 @@
         </p:nvSpPr>
         <p:spPr>
           <a:xfrm>
-            <a:off x="6290118" y="2557841"/>
+            <a:off x="5614706" y="2557841"/>
             <a:ext cx="259772" cy="249382"/>
           </a:xfrm>
           <a:prstGeom prst="rect">
@@ -7655,7 +7991,7 @@
         </p:nvSpPr>
         <p:spPr>
           <a:xfrm>
-            <a:off x="6290118" y="2298067"/>
+            <a:off x="5614706" y="2298067"/>
             <a:ext cx="259772" cy="249382"/>
           </a:xfrm>
           <a:prstGeom prst="rect">
@@ -7711,7 +8047,7 @@
         </p:nvSpPr>
         <p:spPr>
           <a:xfrm>
-            <a:off x="6290118" y="2038291"/>
+            <a:off x="5614706" y="2038291"/>
             <a:ext cx="259772" cy="249382"/>
           </a:xfrm>
           <a:prstGeom prst="rect">
@@ -7767,7 +8103,7 @@
         </p:nvSpPr>
         <p:spPr>
           <a:xfrm>
-            <a:off x="6290118" y="5290652"/>
+            <a:off x="5614706" y="5290652"/>
             <a:ext cx="259772" cy="249382"/>
           </a:xfrm>
           <a:prstGeom prst="rect">
@@ -7823,7 +8159,7 @@
         </p:nvSpPr>
         <p:spPr>
           <a:xfrm rot="16200000">
-            <a:off x="4524902" y="2737547"/>
+            <a:off x="3849490" y="2737547"/>
             <a:ext cx="1932695" cy="276999"/>
           </a:xfrm>
           <a:prstGeom prst="rect">
@@ -7861,7 +8197,7 @@
         </p:nvSpPr>
         <p:spPr>
           <a:xfrm>
-            <a:off x="5967362" y="5614648"/>
+            <a:off x="5291950" y="5614648"/>
             <a:ext cx="1932695" cy="276999"/>
           </a:xfrm>
           <a:prstGeom prst="rect">
@@ -7983,8 +8319,8 @@
         </p:nvCxnSpPr>
         <p:spPr>
           <a:xfrm>
-            <a:off x="7537765" y="1909699"/>
-            <a:ext cx="1932695" cy="0"/>
+            <a:off x="6727269" y="1961654"/>
+            <a:ext cx="2183221" cy="0"/>
           </a:xfrm>
           <a:prstGeom prst="line">
             <a:avLst/>
@@ -8025,9 +8361,9 @@
           <p:nvPr/>
         </p:nvCxnSpPr>
         <p:spPr>
-          <a:xfrm>
-            <a:off x="7537765" y="4305679"/>
-            <a:ext cx="1932695" cy="0"/>
+          <a:xfrm flipV="1">
+            <a:off x="6727269" y="5138347"/>
+            <a:ext cx="2183221" cy="8998"/>
           </a:xfrm>
           <a:prstGeom prst="line">
             <a:avLst/>
@@ -8069,7 +8405,7 @@
         </p:nvCxnSpPr>
         <p:spPr>
           <a:xfrm flipV="1">
-            <a:off x="6571252" y="1628505"/>
+            <a:off x="5760756" y="1680460"/>
             <a:ext cx="955832" cy="463383"/>
           </a:xfrm>
           <a:prstGeom prst="line">
@@ -8112,7 +8448,7 @@
         </p:nvCxnSpPr>
         <p:spPr>
           <a:xfrm>
-            <a:off x="6560572" y="2108356"/>
+            <a:off x="5750076" y="2160311"/>
             <a:ext cx="977192" cy="3110016"/>
           </a:xfrm>
           <a:prstGeom prst="line">
@@ -8153,8 +8489,8 @@
         </p:nvSpPr>
         <p:spPr>
           <a:xfrm>
-            <a:off x="9856317" y="2680854"/>
-            <a:ext cx="2242164" cy="3600986"/>
+            <a:off x="9648497" y="3101647"/>
+            <a:ext cx="2512329" cy="3231654"/>
           </a:xfrm>
           <a:prstGeom prst="rect">
             <a:avLst/>
@@ -8185,14 +8521,6 @@
             </a:endParaRPr>
           </a:p>
           <a:p>
-            <a:r>
-              <a:rPr lang="en-US" sz="1200" dirty="0">
-                <a:latin typeface="Courier" pitchFamily="2" charset="0"/>
-              </a:rPr>
-              <a:t>getSpecificHeatProd()</a:t>
-            </a:r>
-          </a:p>
-          <a:p>
             <a:endParaRPr lang="en-US" sz="1200" dirty="0">
               <a:latin typeface="Courier" pitchFamily="2" charset="0"/>
             </a:endParaRPr>
@@ -8202,7 +8530,7 @@
               <a:rPr lang="en-US" sz="1200" dirty="0" err="1">
                 <a:latin typeface="Courier" pitchFamily="2" charset="0"/>
               </a:rPr>
-              <a:t>calcHeat</a:t>
+              <a:t>decay.calcHeatProd</a:t>
             </a:r>
             <a:r>
               <a:rPr lang="en-US" sz="1200" dirty="0">
@@ -8218,10 +8546,16 @@
           </a:p>
           <a:p>
             <a:r>
+              <a:rPr lang="en-US" sz="1200" dirty="0" err="1">
+                <a:latin typeface="Courier" pitchFamily="2" charset="0"/>
+              </a:rPr>
+              <a:t>aqStep.callAqEquil</a:t>
+            </a:r>
+            <a:r>
               <a:rPr lang="en-US" sz="1200" dirty="0">
                 <a:latin typeface="Courier" pitchFamily="2" charset="0"/>
               </a:rPr>
-              <a:t>callAqEquil()</a:t>
+              <a:t>()</a:t>
             </a:r>
           </a:p>
           <a:p>
@@ -8234,10 +8568,16 @@
           </a:p>
           <a:p>
             <a:r>
+              <a:rPr lang="en-US" sz="1200" dirty="0" err="1">
+                <a:latin typeface="Courier" pitchFamily="2" charset="0"/>
+              </a:rPr>
+              <a:t>aqStep.callAqRockEquil</a:t>
+            </a:r>
+            <a:r>
               <a:rPr lang="en-US" sz="1200" dirty="0">
                 <a:latin typeface="Courier" pitchFamily="2" charset="0"/>
               </a:rPr>
-              <a:t>callAqRockEquil()</a:t>
+              <a:t>()</a:t>
             </a:r>
           </a:p>
           <a:p>
@@ -8250,26 +8590,16 @@
           </a:p>
           <a:p>
             <a:r>
+              <a:rPr lang="en-US" sz="1200" dirty="0" err="1">
+                <a:latin typeface="Courier" pitchFamily="2" charset="0"/>
+              </a:rPr>
+              <a:t>rockEquil.rockEquil</a:t>
+            </a:r>
+            <a:r>
               <a:rPr lang="en-US" sz="1200" dirty="0">
                 <a:latin typeface="Courier" pitchFamily="2" charset="0"/>
               </a:rPr>
-              <a:t>callIceEquil()</a:t>
-            </a:r>
-          </a:p>
-          <a:p>
-            <a:r>
-              <a:rPr lang="en-US" sz="1200" dirty="0">
-                <a:latin typeface="Courier" pitchFamily="2" charset="0"/>
-              </a:rPr>
-              <a:t>    (FREZCHEM)</a:t>
-            </a:r>
-          </a:p>
-          <a:p>
-            <a:r>
-              <a:rPr lang="en-US" sz="1200" dirty="0">
-                <a:latin typeface="Courier" pitchFamily="2" charset="0"/>
-              </a:rPr>
-              <a:t>callRockEquil()</a:t>
+              <a:t>()</a:t>
             </a:r>
           </a:p>
           <a:p>
@@ -8290,7 +8620,35 @@
               <a:rPr lang="en-US" sz="1200" dirty="0" err="1">
                 <a:latin typeface="Courier" pitchFamily="2" charset="0"/>
               </a:rPr>
-              <a:t>calcThermalCond</a:t>
+              <a:t>LookupProps.calcTCond</a:t>
+            </a:r>
+            <a:r>
+              <a:rPr lang="en-US" sz="1200" dirty="0">
+                <a:latin typeface="Courier" pitchFamily="2" charset="0"/>
+              </a:rPr>
+              <a:t>()</a:t>
+            </a:r>
+          </a:p>
+          <a:p>
+            <a:r>
+              <a:rPr lang="en-US" sz="1200" dirty="0" err="1">
+                <a:latin typeface="Courier" pitchFamily="2" charset="0"/>
+              </a:rPr>
+              <a:t>LookupProps.calcHeatCap</a:t>
+            </a:r>
+            <a:r>
+              <a:rPr lang="en-US" sz="1200" dirty="0">
+                <a:latin typeface="Courier" pitchFamily="2" charset="0"/>
+              </a:rPr>
+              <a:t>()</a:t>
+            </a:r>
+          </a:p>
+          <a:p>
+            <a:r>
+              <a:rPr lang="en-US" sz="1200" dirty="0" err="1">
+                <a:latin typeface="Courier" pitchFamily="2" charset="0"/>
+              </a:rPr>
+              <a:t>LookupProps.calcDens</a:t>
             </a:r>
             <a:r>
               <a:rPr lang="en-US" sz="1200" dirty="0">
@@ -8317,8 +8675,8 @@
         </p:nvCxnSpPr>
         <p:spPr>
           <a:xfrm flipV="1">
-            <a:off x="9405946" y="3792682"/>
-            <a:ext cx="450371" cy="872837"/>
+            <a:off x="8933103" y="4166755"/>
+            <a:ext cx="715394" cy="1257302"/>
           </a:xfrm>
           <a:prstGeom prst="line">
             <a:avLst/>
@@ -8346,10 +8704,10 @@
       </p:cxnSp>
       <p:cxnSp>
         <p:nvCxnSpPr>
-          <p:cNvPr id="9" name="Straight Connector 8">
-            <a:extLst>
-              <a:ext uri="{FF2B5EF4-FFF2-40B4-BE49-F238E27FC236}">
-                <a16:creationId xmlns:a16="http://schemas.microsoft.com/office/drawing/2014/main" id="{1C2CBC65-4AC4-274E-A0C9-3BAFBE97FC2C}"/>
+          <p:cNvPr id="16" name="Straight Connector 15">
+            <a:extLst>
+              <a:ext uri="{FF2B5EF4-FFF2-40B4-BE49-F238E27FC236}">
+                <a16:creationId xmlns:a16="http://schemas.microsoft.com/office/drawing/2014/main" id="{788AEF80-A857-E100-A3EA-9630672113BB}"/>
               </a:ext>
             </a:extLst>
           </p:cNvPr>
@@ -8360,8 +8718,8 @@
         </p:nvCxnSpPr>
         <p:spPr>
           <a:xfrm flipV="1">
-            <a:off x="9405946" y="4166755"/>
-            <a:ext cx="450371" cy="498764"/>
+            <a:off x="8910490" y="4540828"/>
+            <a:ext cx="738007" cy="1073820"/>
           </a:xfrm>
           <a:prstGeom prst="line">
             <a:avLst/>
@@ -8389,23 +8747,22 @@
       </p:cxnSp>
       <p:cxnSp>
         <p:nvCxnSpPr>
-          <p:cNvPr id="12" name="Straight Connector 11">
-            <a:extLst>
-              <a:ext uri="{FF2B5EF4-FFF2-40B4-BE49-F238E27FC236}">
-                <a16:creationId xmlns:a16="http://schemas.microsoft.com/office/drawing/2014/main" id="{EEED69B5-B76B-98A2-4054-185EF9C3716E}"/>
+          <p:cNvPr id="20" name="Straight Connector 19">
+            <a:extLst>
+              <a:ext uri="{FF2B5EF4-FFF2-40B4-BE49-F238E27FC236}">
+                <a16:creationId xmlns:a16="http://schemas.microsoft.com/office/drawing/2014/main" id="{CD343EBE-7FD2-C2E6-EF7F-B6CDDB81AA9D}"/>
               </a:ext>
             </a:extLst>
           </p:cNvPr>
           <p:cNvCxnSpPr>
             <a:cxnSpLocks/>
-            <a:endCxn id="4" idx="1"/>
           </p:cNvCxnSpPr>
           <p:nvPr/>
         </p:nvCxnSpPr>
         <p:spPr>
           <a:xfrm flipV="1">
-            <a:off x="9405946" y="4481347"/>
-            <a:ext cx="450371" cy="389445"/>
+            <a:off x="8910489" y="4896346"/>
+            <a:ext cx="738006" cy="718302"/>
           </a:xfrm>
           <a:prstGeom prst="line">
             <a:avLst/>
@@ -8433,10 +8790,10 @@
       </p:cxnSp>
       <p:cxnSp>
         <p:nvCxnSpPr>
-          <p:cNvPr id="18" name="Straight Connector 17">
-            <a:extLst>
-              <a:ext uri="{FF2B5EF4-FFF2-40B4-BE49-F238E27FC236}">
-                <a16:creationId xmlns:a16="http://schemas.microsoft.com/office/drawing/2014/main" id="{1AF56F4E-6661-F903-72D1-DEB4C9AD9778}"/>
+          <p:cNvPr id="39" name="Straight Connector 38">
+            <a:extLst>
+              <a:ext uri="{FF2B5EF4-FFF2-40B4-BE49-F238E27FC236}">
+                <a16:creationId xmlns:a16="http://schemas.microsoft.com/office/drawing/2014/main" id="{470E3F99-06C2-18CB-3C4E-215482797F57}"/>
               </a:ext>
             </a:extLst>
           </p:cNvPr>
@@ -8446,9 +8803,9 @@
           <p:nvPr/>
         </p:nvCxnSpPr>
         <p:spPr>
-          <a:xfrm>
-            <a:off x="9405944" y="4870792"/>
-            <a:ext cx="450373" cy="153160"/>
+          <a:xfrm flipV="1">
+            <a:off x="8910488" y="5270327"/>
+            <a:ext cx="715396" cy="341468"/>
           </a:xfrm>
           <a:prstGeom prst="line">
             <a:avLst/>
@@ -8476,10 +8833,10 @@
       </p:cxnSp>
       <p:cxnSp>
         <p:nvCxnSpPr>
-          <p:cNvPr id="21" name="Straight Connector 20">
-            <a:extLst>
-              <a:ext uri="{FF2B5EF4-FFF2-40B4-BE49-F238E27FC236}">
-                <a16:creationId xmlns:a16="http://schemas.microsoft.com/office/drawing/2014/main" id="{B49FC0E8-6A21-13F4-3DB5-7223125836AB}"/>
+          <p:cNvPr id="53" name="Straight Connector 52">
+            <a:extLst>
+              <a:ext uri="{FF2B5EF4-FFF2-40B4-BE49-F238E27FC236}">
+                <a16:creationId xmlns:a16="http://schemas.microsoft.com/office/drawing/2014/main" id="{98DD5351-6487-DD8A-825F-8CB024885A8E}"/>
               </a:ext>
             </a:extLst>
           </p:cNvPr>
@@ -8490,8 +8847,8 @@
         </p:nvCxnSpPr>
         <p:spPr>
           <a:xfrm>
-            <a:off x="9438202" y="4896981"/>
-            <a:ext cx="418115" cy="442462"/>
+            <a:off x="8910488" y="5792244"/>
+            <a:ext cx="715394" cy="0"/>
           </a:xfrm>
           <a:prstGeom prst="line">
             <a:avLst/>
@@ -8519,10 +8876,10 @@
       </p:cxnSp>
       <p:cxnSp>
         <p:nvCxnSpPr>
-          <p:cNvPr id="38" name="Straight Connector 37">
-            <a:extLst>
-              <a:ext uri="{FF2B5EF4-FFF2-40B4-BE49-F238E27FC236}">
-                <a16:creationId xmlns:a16="http://schemas.microsoft.com/office/drawing/2014/main" id="{80E6FC75-D6FB-E53C-1822-0E719D456EC0}"/>
+          <p:cNvPr id="67" name="Straight Connector 66">
+            <a:extLst>
+              <a:ext uri="{FF2B5EF4-FFF2-40B4-BE49-F238E27FC236}">
+                <a16:creationId xmlns:a16="http://schemas.microsoft.com/office/drawing/2014/main" id="{E0A6B9EF-CE84-30A7-CF7A-EFDF83F670A3}"/>
               </a:ext>
             </a:extLst>
           </p:cNvPr>
@@ -8533,8 +8890,8 @@
         </p:nvCxnSpPr>
         <p:spPr>
           <a:xfrm>
-            <a:off x="9422073" y="4883908"/>
-            <a:ext cx="466502" cy="858580"/>
+            <a:off x="8933103" y="5792244"/>
+            <a:ext cx="692779" cy="152399"/>
           </a:xfrm>
           <a:prstGeom prst="line">
             <a:avLst/>
@@ -8562,10 +8919,10 @@
       </p:cxnSp>
       <p:cxnSp>
         <p:nvCxnSpPr>
-          <p:cNvPr id="42" name="Straight Connector 41">
-            <a:extLst>
-              <a:ext uri="{FF2B5EF4-FFF2-40B4-BE49-F238E27FC236}">
-                <a16:creationId xmlns:a16="http://schemas.microsoft.com/office/drawing/2014/main" id="{A7A4F910-23E3-FD3A-5AC4-81D3622709D2}"/>
+          <p:cNvPr id="70" name="Straight Connector 69">
+            <a:extLst>
+              <a:ext uri="{FF2B5EF4-FFF2-40B4-BE49-F238E27FC236}">
+                <a16:creationId xmlns:a16="http://schemas.microsoft.com/office/drawing/2014/main" id="{16CA4E8B-80D5-FCE2-76C4-D312D0ED76DE}"/>
               </a:ext>
             </a:extLst>
           </p:cNvPr>
@@ -8576,8 +8933,8 @@
         </p:nvCxnSpPr>
         <p:spPr>
           <a:xfrm>
-            <a:off x="9405944" y="5089181"/>
-            <a:ext cx="450373" cy="1235718"/>
+            <a:off x="8910488" y="5792243"/>
+            <a:ext cx="738007" cy="350849"/>
           </a:xfrm>
           <a:prstGeom prst="line">
             <a:avLst/>
@@ -8613,1677 +8970,6 @@
   <p:clrMapOvr>
     <a:masterClrMapping/>
   </p:clrMapOvr>
-  <p:timing>
-    <p:tnLst>
-      <p:par>
-        <p:cTn id="1" dur="indefinite" restart="never" nodeType="tmRoot">
-          <p:childTnLst>
-            <p:seq concurrent="1" nextAc="seek">
-              <p:cTn id="2" dur="indefinite" nodeType="mainSeq">
-                <p:childTnLst>
-                  <p:par>
-                    <p:cTn id="3" fill="hold">
-                      <p:stCondLst>
-                        <p:cond delay="indefinite"/>
-                      </p:stCondLst>
-                      <p:childTnLst>
-                        <p:par>
-                          <p:cTn id="4" fill="hold">
-                            <p:stCondLst>
-                              <p:cond delay="0"/>
-                            </p:stCondLst>
-                            <p:childTnLst>
-                              <p:par>
-                                <p:cTn id="5" presetID="1" presetClass="entr" presetSubtype="0" fill="hold" grpId="0" nodeType="clickEffect">
-                                  <p:stCondLst>
-                                    <p:cond delay="0"/>
-                                  </p:stCondLst>
-                                  <p:childTnLst>
-                                    <p:set>
-                                      <p:cBhvr>
-                                        <p:cTn id="6" dur="1" fill="hold">
-                                          <p:stCondLst>
-                                            <p:cond delay="0"/>
-                                          </p:stCondLst>
-                                        </p:cTn>
-                                        <p:tgtEl>
-                                          <p:spTgt spid="24"/>
-                                        </p:tgtEl>
-                                        <p:attrNameLst>
-                                          <p:attrName>style.visibility</p:attrName>
-                                        </p:attrNameLst>
-                                      </p:cBhvr>
-                                      <p:to>
-                                        <p:strVal val="visible"/>
-                                      </p:to>
-                                    </p:set>
-                                  </p:childTnLst>
-                                </p:cTn>
-                              </p:par>
-                              <p:par>
-                                <p:cTn id="7" presetID="1" presetClass="entr" presetSubtype="0" fill="hold" grpId="0" nodeType="withEffect">
-                                  <p:stCondLst>
-                                    <p:cond delay="0"/>
-                                  </p:stCondLst>
-                                  <p:childTnLst>
-                                    <p:set>
-                                      <p:cBhvr>
-                                        <p:cTn id="8" dur="1" fill="hold">
-                                          <p:stCondLst>
-                                            <p:cond delay="0"/>
-                                          </p:stCondLst>
-                                        </p:cTn>
-                                        <p:tgtEl>
-                                          <p:spTgt spid="25"/>
-                                        </p:tgtEl>
-                                        <p:attrNameLst>
-                                          <p:attrName>style.visibility</p:attrName>
-                                        </p:attrNameLst>
-                                      </p:cBhvr>
-                                      <p:to>
-                                        <p:strVal val="visible"/>
-                                      </p:to>
-                                    </p:set>
-                                  </p:childTnLst>
-                                </p:cTn>
-                              </p:par>
-                              <p:par>
-                                <p:cTn id="9" presetID="1" presetClass="entr" presetSubtype="0" fill="hold" grpId="0" nodeType="withEffect">
-                                  <p:stCondLst>
-                                    <p:cond delay="0"/>
-                                  </p:stCondLst>
-                                  <p:childTnLst>
-                                    <p:set>
-                                      <p:cBhvr>
-                                        <p:cTn id="10" dur="1" fill="hold">
-                                          <p:stCondLst>
-                                            <p:cond delay="0"/>
-                                          </p:stCondLst>
-                                        </p:cTn>
-                                        <p:tgtEl>
-                                          <p:spTgt spid="26"/>
-                                        </p:tgtEl>
-                                        <p:attrNameLst>
-                                          <p:attrName>style.visibility</p:attrName>
-                                        </p:attrNameLst>
-                                      </p:cBhvr>
-                                      <p:to>
-                                        <p:strVal val="visible"/>
-                                      </p:to>
-                                    </p:set>
-                                  </p:childTnLst>
-                                </p:cTn>
-                              </p:par>
-                              <p:par>
-                                <p:cTn id="11" presetID="1" presetClass="entr" presetSubtype="0" fill="hold" grpId="0" nodeType="withEffect">
-                                  <p:stCondLst>
-                                    <p:cond delay="0"/>
-                                  </p:stCondLst>
-                                  <p:childTnLst>
-                                    <p:set>
-                                      <p:cBhvr>
-                                        <p:cTn id="12" dur="1" fill="hold">
-                                          <p:stCondLst>
-                                            <p:cond delay="0"/>
-                                          </p:stCondLst>
-                                        </p:cTn>
-                                        <p:tgtEl>
-                                          <p:spTgt spid="27"/>
-                                        </p:tgtEl>
-                                        <p:attrNameLst>
-                                          <p:attrName>style.visibility</p:attrName>
-                                        </p:attrNameLst>
-                                      </p:cBhvr>
-                                      <p:to>
-                                        <p:strVal val="visible"/>
-                                      </p:to>
-                                    </p:set>
-                                  </p:childTnLst>
-                                </p:cTn>
-                              </p:par>
-                              <p:par>
-                                <p:cTn id="13" presetID="1" presetClass="entr" presetSubtype="0" fill="hold" grpId="0" nodeType="withEffect">
-                                  <p:stCondLst>
-                                    <p:cond delay="0"/>
-                                  </p:stCondLst>
-                                  <p:childTnLst>
-                                    <p:set>
-                                      <p:cBhvr>
-                                        <p:cTn id="14" dur="1" fill="hold">
-                                          <p:stCondLst>
-                                            <p:cond delay="0"/>
-                                          </p:stCondLst>
-                                        </p:cTn>
-                                        <p:tgtEl>
-                                          <p:spTgt spid="28"/>
-                                        </p:tgtEl>
-                                        <p:attrNameLst>
-                                          <p:attrName>style.visibility</p:attrName>
-                                        </p:attrNameLst>
-                                      </p:cBhvr>
-                                      <p:to>
-                                        <p:strVal val="visible"/>
-                                      </p:to>
-                                    </p:set>
-                                  </p:childTnLst>
-                                </p:cTn>
-                              </p:par>
-                              <p:par>
-                                <p:cTn id="15" presetID="1" presetClass="entr" presetSubtype="0" fill="hold" grpId="0" nodeType="withEffect">
-                                  <p:stCondLst>
-                                    <p:cond delay="0"/>
-                                  </p:stCondLst>
-                                  <p:childTnLst>
-                                    <p:set>
-                                      <p:cBhvr>
-                                        <p:cTn id="16" dur="1" fill="hold">
-                                          <p:stCondLst>
-                                            <p:cond delay="0"/>
-                                          </p:stCondLst>
-                                        </p:cTn>
-                                        <p:tgtEl>
-                                          <p:spTgt spid="29"/>
-                                        </p:tgtEl>
-                                        <p:attrNameLst>
-                                          <p:attrName>style.visibility</p:attrName>
-                                        </p:attrNameLst>
-                                      </p:cBhvr>
-                                      <p:to>
-                                        <p:strVal val="visible"/>
-                                      </p:to>
-                                    </p:set>
-                                  </p:childTnLst>
-                                </p:cTn>
-                              </p:par>
-                              <p:par>
-                                <p:cTn id="17" presetID="1" presetClass="entr" presetSubtype="0" fill="hold" grpId="0" nodeType="withEffect">
-                                  <p:stCondLst>
-                                    <p:cond delay="0"/>
-                                  </p:stCondLst>
-                                  <p:childTnLst>
-                                    <p:set>
-                                      <p:cBhvr>
-                                        <p:cTn id="18" dur="1" fill="hold">
-                                          <p:stCondLst>
-                                            <p:cond delay="0"/>
-                                          </p:stCondLst>
-                                        </p:cTn>
-                                        <p:tgtEl>
-                                          <p:spTgt spid="30"/>
-                                        </p:tgtEl>
-                                        <p:attrNameLst>
-                                          <p:attrName>style.visibility</p:attrName>
-                                        </p:attrNameLst>
-                                      </p:cBhvr>
-                                      <p:to>
-                                        <p:strVal val="visible"/>
-                                      </p:to>
-                                    </p:set>
-                                  </p:childTnLst>
-                                </p:cTn>
-                              </p:par>
-                              <p:par>
-                                <p:cTn id="19" presetID="1" presetClass="entr" presetSubtype="0" fill="hold" grpId="0" nodeType="withEffect">
-                                  <p:stCondLst>
-                                    <p:cond delay="0"/>
-                                  </p:stCondLst>
-                                  <p:childTnLst>
-                                    <p:set>
-                                      <p:cBhvr>
-                                        <p:cTn id="20" dur="1" fill="hold">
-                                          <p:stCondLst>
-                                            <p:cond delay="0"/>
-                                          </p:stCondLst>
-                                        </p:cTn>
-                                        <p:tgtEl>
-                                          <p:spTgt spid="31"/>
-                                        </p:tgtEl>
-                                        <p:attrNameLst>
-                                          <p:attrName>style.visibility</p:attrName>
-                                        </p:attrNameLst>
-                                      </p:cBhvr>
-                                      <p:to>
-                                        <p:strVal val="visible"/>
-                                      </p:to>
-                                    </p:set>
-                                  </p:childTnLst>
-                                </p:cTn>
-                              </p:par>
-                              <p:par>
-                                <p:cTn id="21" presetID="1" presetClass="entr" presetSubtype="0" fill="hold" grpId="0" nodeType="withEffect">
-                                  <p:stCondLst>
-                                    <p:cond delay="0"/>
-                                  </p:stCondLst>
-                                  <p:childTnLst>
-                                    <p:set>
-                                      <p:cBhvr>
-                                        <p:cTn id="22" dur="1" fill="hold">
-                                          <p:stCondLst>
-                                            <p:cond delay="0"/>
-                                          </p:stCondLst>
-                                        </p:cTn>
-                                        <p:tgtEl>
-                                          <p:spTgt spid="32"/>
-                                        </p:tgtEl>
-                                        <p:attrNameLst>
-                                          <p:attrName>style.visibility</p:attrName>
-                                        </p:attrNameLst>
-                                      </p:cBhvr>
-                                      <p:to>
-                                        <p:strVal val="visible"/>
-                                      </p:to>
-                                    </p:set>
-                                  </p:childTnLst>
-                                </p:cTn>
-                              </p:par>
-                              <p:par>
-                                <p:cTn id="23" presetID="1" presetClass="entr" presetSubtype="0" fill="hold" grpId="0" nodeType="withEffect">
-                                  <p:stCondLst>
-                                    <p:cond delay="0"/>
-                                  </p:stCondLst>
-                                  <p:childTnLst>
-                                    <p:set>
-                                      <p:cBhvr>
-                                        <p:cTn id="24" dur="1" fill="hold">
-                                          <p:stCondLst>
-                                            <p:cond delay="0"/>
-                                          </p:stCondLst>
-                                        </p:cTn>
-                                        <p:tgtEl>
-                                          <p:spTgt spid="33"/>
-                                        </p:tgtEl>
-                                        <p:attrNameLst>
-                                          <p:attrName>style.visibility</p:attrName>
-                                        </p:attrNameLst>
-                                      </p:cBhvr>
-                                      <p:to>
-                                        <p:strVal val="visible"/>
-                                      </p:to>
-                                    </p:set>
-                                  </p:childTnLst>
-                                </p:cTn>
-                              </p:par>
-                              <p:par>
-                                <p:cTn id="25" presetID="1" presetClass="entr" presetSubtype="0" fill="hold" grpId="0" nodeType="withEffect">
-                                  <p:stCondLst>
-                                    <p:cond delay="0"/>
-                                  </p:stCondLst>
-                                  <p:childTnLst>
-                                    <p:set>
-                                      <p:cBhvr>
-                                        <p:cTn id="26" dur="1" fill="hold">
-                                          <p:stCondLst>
-                                            <p:cond delay="0"/>
-                                          </p:stCondLst>
-                                        </p:cTn>
-                                        <p:tgtEl>
-                                          <p:spTgt spid="34"/>
-                                        </p:tgtEl>
-                                        <p:attrNameLst>
-                                          <p:attrName>style.visibility</p:attrName>
-                                        </p:attrNameLst>
-                                      </p:cBhvr>
-                                      <p:to>
-                                        <p:strVal val="visible"/>
-                                      </p:to>
-                                    </p:set>
-                                  </p:childTnLst>
-                                </p:cTn>
-                              </p:par>
-                              <p:par>
-                                <p:cTn id="27" presetID="1" presetClass="entr" presetSubtype="0" fill="hold" grpId="0" nodeType="withEffect">
-                                  <p:stCondLst>
-                                    <p:cond delay="0"/>
-                                  </p:stCondLst>
-                                  <p:childTnLst>
-                                    <p:set>
-                                      <p:cBhvr>
-                                        <p:cTn id="28" dur="1" fill="hold">
-                                          <p:stCondLst>
-                                            <p:cond delay="0"/>
-                                          </p:stCondLst>
-                                        </p:cTn>
-                                        <p:tgtEl>
-                                          <p:spTgt spid="35"/>
-                                        </p:tgtEl>
-                                        <p:attrNameLst>
-                                          <p:attrName>style.visibility</p:attrName>
-                                        </p:attrNameLst>
-                                      </p:cBhvr>
-                                      <p:to>
-                                        <p:strVal val="visible"/>
-                                      </p:to>
-                                    </p:set>
-                                  </p:childTnLst>
-                                </p:cTn>
-                              </p:par>
-                              <p:par>
-                                <p:cTn id="29" presetID="1" presetClass="entr" presetSubtype="0" fill="hold" grpId="0" nodeType="withEffect">
-                                  <p:stCondLst>
-                                    <p:cond delay="0"/>
-                                  </p:stCondLst>
-                                  <p:childTnLst>
-                                    <p:set>
-                                      <p:cBhvr>
-                                        <p:cTn id="30" dur="1" fill="hold">
-                                          <p:stCondLst>
-                                            <p:cond delay="0"/>
-                                          </p:stCondLst>
-                                        </p:cTn>
-                                        <p:tgtEl>
-                                          <p:spTgt spid="36"/>
-                                        </p:tgtEl>
-                                        <p:attrNameLst>
-                                          <p:attrName>style.visibility</p:attrName>
-                                        </p:attrNameLst>
-                                      </p:cBhvr>
-                                      <p:to>
-                                        <p:strVal val="visible"/>
-                                      </p:to>
-                                    </p:set>
-                                  </p:childTnLst>
-                                </p:cTn>
-                              </p:par>
-                              <p:par>
-                                <p:cTn id="31" presetID="1" presetClass="entr" presetSubtype="0" fill="hold" grpId="0" nodeType="withEffect">
-                                  <p:stCondLst>
-                                    <p:cond delay="0"/>
-                                  </p:stCondLst>
-                                  <p:childTnLst>
-                                    <p:set>
-                                      <p:cBhvr>
-                                        <p:cTn id="32" dur="1" fill="hold">
-                                          <p:stCondLst>
-                                            <p:cond delay="0"/>
-                                          </p:stCondLst>
-                                        </p:cTn>
-                                        <p:tgtEl>
-                                          <p:spTgt spid="37"/>
-                                        </p:tgtEl>
-                                        <p:attrNameLst>
-                                          <p:attrName>style.visibility</p:attrName>
-                                        </p:attrNameLst>
-                                      </p:cBhvr>
-                                      <p:to>
-                                        <p:strVal val="visible"/>
-                                      </p:to>
-                                    </p:set>
-                                  </p:childTnLst>
-                                </p:cTn>
-                              </p:par>
-                              <p:par>
-                                <p:cTn id="33" presetID="1" presetClass="entr" presetSubtype="0" fill="hold" nodeType="withEffect">
-                                  <p:stCondLst>
-                                    <p:cond delay="0"/>
-                                  </p:stCondLst>
-                                  <p:childTnLst>
-                                    <p:set>
-                                      <p:cBhvr>
-                                        <p:cTn id="34" dur="1" fill="hold">
-                                          <p:stCondLst>
-                                            <p:cond delay="0"/>
-                                          </p:stCondLst>
-                                        </p:cTn>
-                                        <p:tgtEl>
-                                          <p:spTgt spid="48"/>
-                                        </p:tgtEl>
-                                        <p:attrNameLst>
-                                          <p:attrName>style.visibility</p:attrName>
-                                        </p:attrNameLst>
-                                      </p:cBhvr>
-                                      <p:to>
-                                        <p:strVal val="visible"/>
-                                      </p:to>
-                                    </p:set>
-                                  </p:childTnLst>
-                                </p:cTn>
-                              </p:par>
-                              <p:par>
-                                <p:cTn id="35" presetID="1" presetClass="entr" presetSubtype="0" fill="hold" nodeType="withEffect">
-                                  <p:stCondLst>
-                                    <p:cond delay="0"/>
-                                  </p:stCondLst>
-                                  <p:childTnLst>
-                                    <p:set>
-                                      <p:cBhvr>
-                                        <p:cTn id="36" dur="1" fill="hold">
-                                          <p:stCondLst>
-                                            <p:cond delay="0"/>
-                                          </p:stCondLst>
-                                        </p:cTn>
-                                        <p:tgtEl>
-                                          <p:spTgt spid="50"/>
-                                        </p:tgtEl>
-                                        <p:attrNameLst>
-                                          <p:attrName>style.visibility</p:attrName>
-                                        </p:attrNameLst>
-                                      </p:cBhvr>
-                                      <p:to>
-                                        <p:strVal val="visible"/>
-                                      </p:to>
-                                    </p:set>
-                                  </p:childTnLst>
-                                </p:cTn>
-                              </p:par>
-                              <p:par>
-                                <p:cTn id="37" presetID="1" presetClass="entr" presetSubtype="0" fill="hold" grpId="0" nodeType="withEffect">
-                                  <p:stCondLst>
-                                    <p:cond delay="0"/>
-                                  </p:stCondLst>
-                                  <p:childTnLst>
-                                    <p:set>
-                                      <p:cBhvr>
-                                        <p:cTn id="38" dur="1" fill="hold">
-                                          <p:stCondLst>
-                                            <p:cond delay="0"/>
-                                          </p:stCondLst>
-                                        </p:cTn>
-                                        <p:tgtEl>
-                                          <p:spTgt spid="54"/>
-                                        </p:tgtEl>
-                                        <p:attrNameLst>
-                                          <p:attrName>style.visibility</p:attrName>
-                                        </p:attrNameLst>
-                                      </p:cBhvr>
-                                      <p:to>
-                                        <p:strVal val="visible"/>
-                                      </p:to>
-                                    </p:set>
-                                  </p:childTnLst>
-                                </p:cTn>
-                              </p:par>
-                              <p:par>
-                                <p:cTn id="39" presetID="1" presetClass="entr" presetSubtype="0" fill="hold" grpId="0" nodeType="withEffect">
-                                  <p:stCondLst>
-                                    <p:cond delay="0"/>
-                                  </p:stCondLst>
-                                  <p:childTnLst>
-                                    <p:set>
-                                      <p:cBhvr>
-                                        <p:cTn id="40" dur="1" fill="hold">
-                                          <p:stCondLst>
-                                            <p:cond delay="0"/>
-                                          </p:stCondLst>
-                                        </p:cTn>
-                                        <p:tgtEl>
-                                          <p:spTgt spid="55"/>
-                                        </p:tgtEl>
-                                        <p:attrNameLst>
-                                          <p:attrName>style.visibility</p:attrName>
-                                        </p:attrNameLst>
-                                      </p:cBhvr>
-                                      <p:to>
-                                        <p:strVal val="visible"/>
-                                      </p:to>
-                                    </p:set>
-                                  </p:childTnLst>
-                                </p:cTn>
-                              </p:par>
-                            </p:childTnLst>
-                          </p:cTn>
-                        </p:par>
-                      </p:childTnLst>
-                    </p:cTn>
-                  </p:par>
-                  <p:par>
-                    <p:cTn id="41" fill="hold">
-                      <p:stCondLst>
-                        <p:cond delay="indefinite"/>
-                      </p:stCondLst>
-                      <p:childTnLst>
-                        <p:par>
-                          <p:cTn id="42" fill="hold">
-                            <p:stCondLst>
-                              <p:cond delay="0"/>
-                            </p:stCondLst>
-                            <p:childTnLst>
-                              <p:par>
-                                <p:cTn id="43" presetID="1" presetClass="entr" presetSubtype="0" fill="hold" grpId="0" nodeType="clickEffect">
-                                  <p:stCondLst>
-                                    <p:cond delay="0"/>
-                                  </p:stCondLst>
-                                  <p:childTnLst>
-                                    <p:set>
-                                      <p:cBhvr>
-                                        <p:cTn id="44" dur="1" fill="hold">
-                                          <p:stCondLst>
-                                            <p:cond delay="0"/>
-                                          </p:stCondLst>
-                                        </p:cTn>
-                                        <p:tgtEl>
-                                          <p:spTgt spid="46"/>
-                                        </p:tgtEl>
-                                        <p:attrNameLst>
-                                          <p:attrName>style.visibility</p:attrName>
-                                        </p:attrNameLst>
-                                      </p:cBhvr>
-                                      <p:to>
-                                        <p:strVal val="visible"/>
-                                      </p:to>
-                                    </p:set>
-                                  </p:childTnLst>
-                                </p:cTn>
-                              </p:par>
-                              <p:par>
-                                <p:cTn id="45" presetID="1" presetClass="entr" presetSubtype="0" fill="hold" grpId="0" nodeType="withEffect">
-                                  <p:stCondLst>
-                                    <p:cond delay="0"/>
-                                  </p:stCondLst>
-                                  <p:childTnLst>
-                                    <p:set>
-                                      <p:cBhvr>
-                                        <p:cTn id="46" dur="1" fill="hold">
-                                          <p:stCondLst>
-                                            <p:cond delay="0"/>
-                                          </p:stCondLst>
-                                        </p:cTn>
-                                        <p:tgtEl>
-                                          <p:spTgt spid="47"/>
-                                        </p:tgtEl>
-                                        <p:attrNameLst>
-                                          <p:attrName>style.visibility</p:attrName>
-                                        </p:attrNameLst>
-                                      </p:cBhvr>
-                                      <p:to>
-                                        <p:strVal val="visible"/>
-                                      </p:to>
-                                    </p:set>
-                                  </p:childTnLst>
-                                </p:cTn>
-                              </p:par>
-                              <p:par>
-                                <p:cTn id="47" presetID="1" presetClass="entr" presetSubtype="0" fill="hold" grpId="0" nodeType="withEffect">
-                                  <p:stCondLst>
-                                    <p:cond delay="0"/>
-                                  </p:stCondLst>
-                                  <p:childTnLst>
-                                    <p:set>
-                                      <p:cBhvr>
-                                        <p:cTn id="48" dur="1" fill="hold">
-                                          <p:stCondLst>
-                                            <p:cond delay="0"/>
-                                          </p:stCondLst>
-                                        </p:cTn>
-                                        <p:tgtEl>
-                                          <p:spTgt spid="49"/>
-                                        </p:tgtEl>
-                                        <p:attrNameLst>
-                                          <p:attrName>style.visibility</p:attrName>
-                                        </p:attrNameLst>
-                                      </p:cBhvr>
-                                      <p:to>
-                                        <p:strVal val="visible"/>
-                                      </p:to>
-                                    </p:set>
-                                  </p:childTnLst>
-                                </p:cTn>
-                              </p:par>
-                              <p:par>
-                                <p:cTn id="49" presetID="1" presetClass="entr" presetSubtype="0" fill="hold" grpId="0" nodeType="withEffect">
-                                  <p:stCondLst>
-                                    <p:cond delay="0"/>
-                                  </p:stCondLst>
-                                  <p:childTnLst>
-                                    <p:set>
-                                      <p:cBhvr>
-                                        <p:cTn id="50" dur="1" fill="hold">
-                                          <p:stCondLst>
-                                            <p:cond delay="0"/>
-                                          </p:stCondLst>
-                                        </p:cTn>
-                                        <p:tgtEl>
-                                          <p:spTgt spid="51"/>
-                                        </p:tgtEl>
-                                        <p:attrNameLst>
-                                          <p:attrName>style.visibility</p:attrName>
-                                        </p:attrNameLst>
-                                      </p:cBhvr>
-                                      <p:to>
-                                        <p:strVal val="visible"/>
-                                      </p:to>
-                                    </p:set>
-                                  </p:childTnLst>
-                                </p:cTn>
-                              </p:par>
-                              <p:par>
-                                <p:cTn id="51" presetID="1" presetClass="entr" presetSubtype="0" fill="hold" grpId="0" nodeType="withEffect">
-                                  <p:stCondLst>
-                                    <p:cond delay="0"/>
-                                  </p:stCondLst>
-                                  <p:childTnLst>
-                                    <p:set>
-                                      <p:cBhvr>
-                                        <p:cTn id="52" dur="1" fill="hold">
-                                          <p:stCondLst>
-                                            <p:cond delay="0"/>
-                                          </p:stCondLst>
-                                        </p:cTn>
-                                        <p:tgtEl>
-                                          <p:spTgt spid="52"/>
-                                        </p:tgtEl>
-                                        <p:attrNameLst>
-                                          <p:attrName>style.visibility</p:attrName>
-                                        </p:attrNameLst>
-                                      </p:cBhvr>
-                                      <p:to>
-                                        <p:strVal val="visible"/>
-                                      </p:to>
-                                    </p:set>
-                                  </p:childTnLst>
-                                </p:cTn>
-                              </p:par>
-                              <p:par>
-                                <p:cTn id="53" presetID="1" presetClass="entr" presetSubtype="0" fill="hold" grpId="0" nodeType="withEffect">
-                                  <p:stCondLst>
-                                    <p:cond delay="0"/>
-                                  </p:stCondLst>
-                                  <p:childTnLst>
-                                    <p:set>
-                                      <p:cBhvr>
-                                        <p:cTn id="54" dur="1" fill="hold">
-                                          <p:stCondLst>
-                                            <p:cond delay="0"/>
-                                          </p:stCondLst>
-                                        </p:cTn>
-                                        <p:tgtEl>
-                                          <p:spTgt spid="57"/>
-                                        </p:tgtEl>
-                                        <p:attrNameLst>
-                                          <p:attrName>style.visibility</p:attrName>
-                                        </p:attrNameLst>
-                                      </p:cBhvr>
-                                      <p:to>
-                                        <p:strVal val="visible"/>
-                                      </p:to>
-                                    </p:set>
-                                  </p:childTnLst>
-                                </p:cTn>
-                              </p:par>
-                              <p:par>
-                                <p:cTn id="55" presetID="1" presetClass="entr" presetSubtype="0" fill="hold" grpId="0" nodeType="withEffect">
-                                  <p:stCondLst>
-                                    <p:cond delay="0"/>
-                                  </p:stCondLst>
-                                  <p:childTnLst>
-                                    <p:set>
-                                      <p:cBhvr>
-                                        <p:cTn id="56" dur="1" fill="hold">
-                                          <p:stCondLst>
-                                            <p:cond delay="0"/>
-                                          </p:stCondLst>
-                                        </p:cTn>
-                                        <p:tgtEl>
-                                          <p:spTgt spid="58"/>
-                                        </p:tgtEl>
-                                        <p:attrNameLst>
-                                          <p:attrName>style.visibility</p:attrName>
-                                        </p:attrNameLst>
-                                      </p:cBhvr>
-                                      <p:to>
-                                        <p:strVal val="visible"/>
-                                      </p:to>
-                                    </p:set>
-                                  </p:childTnLst>
-                                </p:cTn>
-                              </p:par>
-                              <p:par>
-                                <p:cTn id="57" presetID="1" presetClass="entr" presetSubtype="0" fill="hold" grpId="0" nodeType="withEffect">
-                                  <p:stCondLst>
-                                    <p:cond delay="0"/>
-                                  </p:stCondLst>
-                                  <p:childTnLst>
-                                    <p:set>
-                                      <p:cBhvr>
-                                        <p:cTn id="58" dur="1" fill="hold">
-                                          <p:stCondLst>
-                                            <p:cond delay="0"/>
-                                          </p:stCondLst>
-                                        </p:cTn>
-                                        <p:tgtEl>
-                                          <p:spTgt spid="59"/>
-                                        </p:tgtEl>
-                                        <p:attrNameLst>
-                                          <p:attrName>style.visibility</p:attrName>
-                                        </p:attrNameLst>
-                                      </p:cBhvr>
-                                      <p:to>
-                                        <p:strVal val="visible"/>
-                                      </p:to>
-                                    </p:set>
-                                  </p:childTnLst>
-                                </p:cTn>
-                              </p:par>
-                              <p:par>
-                                <p:cTn id="59" presetID="1" presetClass="entr" presetSubtype="0" fill="hold" grpId="0" nodeType="withEffect">
-                                  <p:stCondLst>
-                                    <p:cond delay="0"/>
-                                  </p:stCondLst>
-                                  <p:childTnLst>
-                                    <p:set>
-                                      <p:cBhvr>
-                                        <p:cTn id="60" dur="1" fill="hold">
-                                          <p:stCondLst>
-                                            <p:cond delay="0"/>
-                                          </p:stCondLst>
-                                        </p:cTn>
-                                        <p:tgtEl>
-                                          <p:spTgt spid="60"/>
-                                        </p:tgtEl>
-                                        <p:attrNameLst>
-                                          <p:attrName>style.visibility</p:attrName>
-                                        </p:attrNameLst>
-                                      </p:cBhvr>
-                                      <p:to>
-                                        <p:strVal val="visible"/>
-                                      </p:to>
-                                    </p:set>
-                                  </p:childTnLst>
-                                </p:cTn>
-                              </p:par>
-                              <p:par>
-                                <p:cTn id="61" presetID="1" presetClass="entr" presetSubtype="0" fill="hold" grpId="0" nodeType="withEffect">
-                                  <p:stCondLst>
-                                    <p:cond delay="0"/>
-                                  </p:stCondLst>
-                                  <p:childTnLst>
-                                    <p:set>
-                                      <p:cBhvr>
-                                        <p:cTn id="62" dur="1" fill="hold">
-                                          <p:stCondLst>
-                                            <p:cond delay="0"/>
-                                          </p:stCondLst>
-                                        </p:cTn>
-                                        <p:tgtEl>
-                                          <p:spTgt spid="61"/>
-                                        </p:tgtEl>
-                                        <p:attrNameLst>
-                                          <p:attrName>style.visibility</p:attrName>
-                                        </p:attrNameLst>
-                                      </p:cBhvr>
-                                      <p:to>
-                                        <p:strVal val="visible"/>
-                                      </p:to>
-                                    </p:set>
-                                  </p:childTnLst>
-                                </p:cTn>
-                              </p:par>
-                              <p:par>
-                                <p:cTn id="63" presetID="1" presetClass="entr" presetSubtype="0" fill="hold" grpId="0" nodeType="withEffect">
-                                  <p:stCondLst>
-                                    <p:cond delay="0"/>
-                                  </p:stCondLst>
-                                  <p:childTnLst>
-                                    <p:set>
-                                      <p:cBhvr>
-                                        <p:cTn id="64" dur="1" fill="hold">
-                                          <p:stCondLst>
-                                            <p:cond delay="0"/>
-                                          </p:stCondLst>
-                                        </p:cTn>
-                                        <p:tgtEl>
-                                          <p:spTgt spid="62"/>
-                                        </p:tgtEl>
-                                        <p:attrNameLst>
-                                          <p:attrName>style.visibility</p:attrName>
-                                        </p:attrNameLst>
-                                      </p:cBhvr>
-                                      <p:to>
-                                        <p:strVal val="visible"/>
-                                      </p:to>
-                                    </p:set>
-                                  </p:childTnLst>
-                                </p:cTn>
-                              </p:par>
-                              <p:par>
-                                <p:cTn id="65" presetID="1" presetClass="entr" presetSubtype="0" fill="hold" grpId="0" nodeType="withEffect">
-                                  <p:stCondLst>
-                                    <p:cond delay="0"/>
-                                  </p:stCondLst>
-                                  <p:childTnLst>
-                                    <p:set>
-                                      <p:cBhvr>
-                                        <p:cTn id="66" dur="1" fill="hold">
-                                          <p:stCondLst>
-                                            <p:cond delay="0"/>
-                                          </p:stCondLst>
-                                        </p:cTn>
-                                        <p:tgtEl>
-                                          <p:spTgt spid="63"/>
-                                        </p:tgtEl>
-                                        <p:attrNameLst>
-                                          <p:attrName>style.visibility</p:attrName>
-                                        </p:attrNameLst>
-                                      </p:cBhvr>
-                                      <p:to>
-                                        <p:strVal val="visible"/>
-                                      </p:to>
-                                    </p:set>
-                                  </p:childTnLst>
-                                </p:cTn>
-                              </p:par>
-                              <p:par>
-                                <p:cTn id="67" presetID="1" presetClass="entr" presetSubtype="0" fill="hold" grpId="0" nodeType="withEffect">
-                                  <p:stCondLst>
-                                    <p:cond delay="0"/>
-                                  </p:stCondLst>
-                                  <p:childTnLst>
-                                    <p:set>
-                                      <p:cBhvr>
-                                        <p:cTn id="68" dur="1" fill="hold">
-                                          <p:stCondLst>
-                                            <p:cond delay="0"/>
-                                          </p:stCondLst>
-                                        </p:cTn>
-                                        <p:tgtEl>
-                                          <p:spTgt spid="64"/>
-                                        </p:tgtEl>
-                                        <p:attrNameLst>
-                                          <p:attrName>style.visibility</p:attrName>
-                                        </p:attrNameLst>
-                                      </p:cBhvr>
-                                      <p:to>
-                                        <p:strVal val="visible"/>
-                                      </p:to>
-                                    </p:set>
-                                  </p:childTnLst>
-                                </p:cTn>
-                              </p:par>
-                              <p:par>
-                                <p:cTn id="69" presetID="1" presetClass="entr" presetSubtype="0" fill="hold" grpId="0" nodeType="withEffect">
-                                  <p:stCondLst>
-                                    <p:cond delay="0"/>
-                                  </p:stCondLst>
-                                  <p:childTnLst>
-                                    <p:set>
-                                      <p:cBhvr>
-                                        <p:cTn id="70" dur="1" fill="hold">
-                                          <p:stCondLst>
-                                            <p:cond delay="0"/>
-                                          </p:stCondLst>
-                                        </p:cTn>
-                                        <p:tgtEl>
-                                          <p:spTgt spid="65"/>
-                                        </p:tgtEl>
-                                        <p:attrNameLst>
-                                          <p:attrName>style.visibility</p:attrName>
-                                        </p:attrNameLst>
-                                      </p:cBhvr>
-                                      <p:to>
-                                        <p:strVal val="visible"/>
-                                      </p:to>
-                                    </p:set>
-                                  </p:childTnLst>
-                                </p:cTn>
-                              </p:par>
-                            </p:childTnLst>
-                          </p:cTn>
-                        </p:par>
-                      </p:childTnLst>
-                    </p:cTn>
-                  </p:par>
-                  <p:par>
-                    <p:cTn id="71" fill="hold">
-                      <p:stCondLst>
-                        <p:cond delay="indefinite"/>
-                      </p:stCondLst>
-                      <p:childTnLst>
-                        <p:par>
-                          <p:cTn id="72" fill="hold">
-                            <p:stCondLst>
-                              <p:cond delay="0"/>
-                            </p:stCondLst>
-                            <p:childTnLst>
-                              <p:par>
-                                <p:cTn id="73" presetID="1" presetClass="entr" presetSubtype="0" fill="hold" grpId="0" nodeType="clickEffect">
-                                  <p:stCondLst>
-                                    <p:cond delay="0"/>
-                                  </p:stCondLst>
-                                  <p:childTnLst>
-                                    <p:set>
-                                      <p:cBhvr>
-                                        <p:cTn id="74" dur="1" fill="hold">
-                                          <p:stCondLst>
-                                            <p:cond delay="0"/>
-                                          </p:stCondLst>
-                                        </p:cTn>
-                                        <p:tgtEl>
-                                          <p:spTgt spid="80"/>
-                                        </p:tgtEl>
-                                        <p:attrNameLst>
-                                          <p:attrName>style.visibility</p:attrName>
-                                        </p:attrNameLst>
-                                      </p:cBhvr>
-                                      <p:to>
-                                        <p:strVal val="visible"/>
-                                      </p:to>
-                                    </p:set>
-                                  </p:childTnLst>
-                                </p:cTn>
-                              </p:par>
-                              <p:par>
-                                <p:cTn id="75" presetID="1" presetClass="entr" presetSubtype="0" fill="hold" grpId="0" nodeType="withEffect">
-                                  <p:stCondLst>
-                                    <p:cond delay="0"/>
-                                  </p:stCondLst>
-                                  <p:childTnLst>
-                                    <p:set>
-                                      <p:cBhvr>
-                                        <p:cTn id="76" dur="1" fill="hold">
-                                          <p:stCondLst>
-                                            <p:cond delay="0"/>
-                                          </p:stCondLst>
-                                        </p:cTn>
-                                        <p:tgtEl>
-                                          <p:spTgt spid="81"/>
-                                        </p:tgtEl>
-                                        <p:attrNameLst>
-                                          <p:attrName>style.visibility</p:attrName>
-                                        </p:attrNameLst>
-                                      </p:cBhvr>
-                                      <p:to>
-                                        <p:strVal val="visible"/>
-                                      </p:to>
-                                    </p:set>
-                                  </p:childTnLst>
-                                </p:cTn>
-                              </p:par>
-                              <p:par>
-                                <p:cTn id="77" presetID="1" presetClass="entr" presetSubtype="0" fill="hold" grpId="0" nodeType="withEffect">
-                                  <p:stCondLst>
-                                    <p:cond delay="0"/>
-                                  </p:stCondLst>
-                                  <p:childTnLst>
-                                    <p:set>
-                                      <p:cBhvr>
-                                        <p:cTn id="78" dur="1" fill="hold">
-                                          <p:stCondLst>
-                                            <p:cond delay="0"/>
-                                          </p:stCondLst>
-                                        </p:cTn>
-                                        <p:tgtEl>
-                                          <p:spTgt spid="82"/>
-                                        </p:tgtEl>
-                                        <p:attrNameLst>
-                                          <p:attrName>style.visibility</p:attrName>
-                                        </p:attrNameLst>
-                                      </p:cBhvr>
-                                      <p:to>
-                                        <p:strVal val="visible"/>
-                                      </p:to>
-                                    </p:set>
-                                  </p:childTnLst>
-                                </p:cTn>
-                              </p:par>
-                              <p:par>
-                                <p:cTn id="79" presetID="1" presetClass="entr" presetSubtype="0" fill="hold" grpId="0" nodeType="withEffect">
-                                  <p:stCondLst>
-                                    <p:cond delay="0"/>
-                                  </p:stCondLst>
-                                  <p:childTnLst>
-                                    <p:set>
-                                      <p:cBhvr>
-                                        <p:cTn id="80" dur="1" fill="hold">
-                                          <p:stCondLst>
-                                            <p:cond delay="0"/>
-                                          </p:stCondLst>
-                                        </p:cTn>
-                                        <p:tgtEl>
-                                          <p:spTgt spid="83"/>
-                                        </p:tgtEl>
-                                        <p:attrNameLst>
-                                          <p:attrName>style.visibility</p:attrName>
-                                        </p:attrNameLst>
-                                      </p:cBhvr>
-                                      <p:to>
-                                        <p:strVal val="visible"/>
-                                      </p:to>
-                                    </p:set>
-                                  </p:childTnLst>
-                                </p:cTn>
-                              </p:par>
-                              <p:par>
-                                <p:cTn id="81" presetID="1" presetClass="entr" presetSubtype="0" fill="hold" grpId="0" nodeType="withEffect">
-                                  <p:stCondLst>
-                                    <p:cond delay="0"/>
-                                  </p:stCondLst>
-                                  <p:childTnLst>
-                                    <p:set>
-                                      <p:cBhvr>
-                                        <p:cTn id="82" dur="1" fill="hold">
-                                          <p:stCondLst>
-                                            <p:cond delay="0"/>
-                                          </p:stCondLst>
-                                        </p:cTn>
-                                        <p:tgtEl>
-                                          <p:spTgt spid="84"/>
-                                        </p:tgtEl>
-                                        <p:attrNameLst>
-                                          <p:attrName>style.visibility</p:attrName>
-                                        </p:attrNameLst>
-                                      </p:cBhvr>
-                                      <p:to>
-                                        <p:strVal val="visible"/>
-                                      </p:to>
-                                    </p:set>
-                                  </p:childTnLst>
-                                </p:cTn>
-                              </p:par>
-                              <p:par>
-                                <p:cTn id="83" presetID="1" presetClass="entr" presetSubtype="0" fill="hold" grpId="0" nodeType="withEffect">
-                                  <p:stCondLst>
-                                    <p:cond delay="0"/>
-                                  </p:stCondLst>
-                                  <p:childTnLst>
-                                    <p:set>
-                                      <p:cBhvr>
-                                        <p:cTn id="84" dur="1" fill="hold">
-                                          <p:stCondLst>
-                                            <p:cond delay="0"/>
-                                          </p:stCondLst>
-                                        </p:cTn>
-                                        <p:tgtEl>
-                                          <p:spTgt spid="85"/>
-                                        </p:tgtEl>
-                                        <p:attrNameLst>
-                                          <p:attrName>style.visibility</p:attrName>
-                                        </p:attrNameLst>
-                                      </p:cBhvr>
-                                      <p:to>
-                                        <p:strVal val="visible"/>
-                                      </p:to>
-                                    </p:set>
-                                  </p:childTnLst>
-                                </p:cTn>
-                              </p:par>
-                              <p:par>
-                                <p:cTn id="85" presetID="1" presetClass="entr" presetSubtype="0" fill="hold" grpId="0" nodeType="withEffect">
-                                  <p:stCondLst>
-                                    <p:cond delay="0"/>
-                                  </p:stCondLst>
-                                  <p:childTnLst>
-                                    <p:set>
-                                      <p:cBhvr>
-                                        <p:cTn id="86" dur="1" fill="hold">
-                                          <p:stCondLst>
-                                            <p:cond delay="0"/>
-                                          </p:stCondLst>
-                                        </p:cTn>
-                                        <p:tgtEl>
-                                          <p:spTgt spid="86"/>
-                                        </p:tgtEl>
-                                        <p:attrNameLst>
-                                          <p:attrName>style.visibility</p:attrName>
-                                        </p:attrNameLst>
-                                      </p:cBhvr>
-                                      <p:to>
-                                        <p:strVal val="visible"/>
-                                      </p:to>
-                                    </p:set>
-                                  </p:childTnLst>
-                                </p:cTn>
-                              </p:par>
-                              <p:par>
-                                <p:cTn id="87" presetID="1" presetClass="entr" presetSubtype="0" fill="hold" grpId="0" nodeType="withEffect">
-                                  <p:stCondLst>
-                                    <p:cond delay="0"/>
-                                  </p:stCondLst>
-                                  <p:childTnLst>
-                                    <p:set>
-                                      <p:cBhvr>
-                                        <p:cTn id="88" dur="1" fill="hold">
-                                          <p:stCondLst>
-                                            <p:cond delay="0"/>
-                                          </p:stCondLst>
-                                        </p:cTn>
-                                        <p:tgtEl>
-                                          <p:spTgt spid="87"/>
-                                        </p:tgtEl>
-                                        <p:attrNameLst>
-                                          <p:attrName>style.visibility</p:attrName>
-                                        </p:attrNameLst>
-                                      </p:cBhvr>
-                                      <p:to>
-                                        <p:strVal val="visible"/>
-                                      </p:to>
-                                    </p:set>
-                                  </p:childTnLst>
-                                </p:cTn>
-                              </p:par>
-                              <p:par>
-                                <p:cTn id="89" presetID="1" presetClass="entr" presetSubtype="0" fill="hold" grpId="0" nodeType="withEffect">
-                                  <p:stCondLst>
-                                    <p:cond delay="0"/>
-                                  </p:stCondLst>
-                                  <p:childTnLst>
-                                    <p:set>
-                                      <p:cBhvr>
-                                        <p:cTn id="90" dur="1" fill="hold">
-                                          <p:stCondLst>
-                                            <p:cond delay="0"/>
-                                          </p:stCondLst>
-                                        </p:cTn>
-                                        <p:tgtEl>
-                                          <p:spTgt spid="88"/>
-                                        </p:tgtEl>
-                                        <p:attrNameLst>
-                                          <p:attrName>style.visibility</p:attrName>
-                                        </p:attrNameLst>
-                                      </p:cBhvr>
-                                      <p:to>
-                                        <p:strVal val="visible"/>
-                                      </p:to>
-                                    </p:set>
-                                  </p:childTnLst>
-                                </p:cTn>
-                              </p:par>
-                              <p:par>
-                                <p:cTn id="91" presetID="1" presetClass="entr" presetSubtype="0" fill="hold" grpId="0" nodeType="withEffect">
-                                  <p:stCondLst>
-                                    <p:cond delay="0"/>
-                                  </p:stCondLst>
-                                  <p:childTnLst>
-                                    <p:set>
-                                      <p:cBhvr>
-                                        <p:cTn id="92" dur="1" fill="hold">
-                                          <p:stCondLst>
-                                            <p:cond delay="0"/>
-                                          </p:stCondLst>
-                                        </p:cTn>
-                                        <p:tgtEl>
-                                          <p:spTgt spid="89"/>
-                                        </p:tgtEl>
-                                        <p:attrNameLst>
-                                          <p:attrName>style.visibility</p:attrName>
-                                        </p:attrNameLst>
-                                      </p:cBhvr>
-                                      <p:to>
-                                        <p:strVal val="visible"/>
-                                      </p:to>
-                                    </p:set>
-                                  </p:childTnLst>
-                                </p:cTn>
-                              </p:par>
-                              <p:par>
-                                <p:cTn id="93" presetID="1" presetClass="entr" presetSubtype="0" fill="hold" grpId="0" nodeType="withEffect">
-                                  <p:stCondLst>
-                                    <p:cond delay="0"/>
-                                  </p:stCondLst>
-                                  <p:childTnLst>
-                                    <p:set>
-                                      <p:cBhvr>
-                                        <p:cTn id="94" dur="1" fill="hold">
-                                          <p:stCondLst>
-                                            <p:cond delay="0"/>
-                                          </p:stCondLst>
-                                        </p:cTn>
-                                        <p:tgtEl>
-                                          <p:spTgt spid="90"/>
-                                        </p:tgtEl>
-                                        <p:attrNameLst>
-                                          <p:attrName>style.visibility</p:attrName>
-                                        </p:attrNameLst>
-                                      </p:cBhvr>
-                                      <p:to>
-                                        <p:strVal val="visible"/>
-                                      </p:to>
-                                    </p:set>
-                                  </p:childTnLst>
-                                </p:cTn>
-                              </p:par>
-                              <p:par>
-                                <p:cTn id="95" presetID="1" presetClass="entr" presetSubtype="0" fill="hold" grpId="0" nodeType="withEffect">
-                                  <p:stCondLst>
-                                    <p:cond delay="0"/>
-                                  </p:stCondLst>
-                                  <p:childTnLst>
-                                    <p:set>
-                                      <p:cBhvr>
-                                        <p:cTn id="96" dur="1" fill="hold">
-                                          <p:stCondLst>
-                                            <p:cond delay="0"/>
-                                          </p:stCondLst>
-                                        </p:cTn>
-                                        <p:tgtEl>
-                                          <p:spTgt spid="91"/>
-                                        </p:tgtEl>
-                                        <p:attrNameLst>
-                                          <p:attrName>style.visibility</p:attrName>
-                                        </p:attrNameLst>
-                                      </p:cBhvr>
-                                      <p:to>
-                                        <p:strVal val="visible"/>
-                                      </p:to>
-                                    </p:set>
-                                  </p:childTnLst>
-                                </p:cTn>
-                              </p:par>
-                              <p:par>
-                                <p:cTn id="97" presetID="1" presetClass="entr" presetSubtype="0" fill="hold" grpId="0" nodeType="withEffect">
-                                  <p:stCondLst>
-                                    <p:cond delay="0"/>
-                                  </p:stCondLst>
-                                  <p:childTnLst>
-                                    <p:set>
-                                      <p:cBhvr>
-                                        <p:cTn id="98" dur="1" fill="hold">
-                                          <p:stCondLst>
-                                            <p:cond delay="0"/>
-                                          </p:stCondLst>
-                                        </p:cTn>
-                                        <p:tgtEl>
-                                          <p:spTgt spid="92"/>
-                                        </p:tgtEl>
-                                        <p:attrNameLst>
-                                          <p:attrName>style.visibility</p:attrName>
-                                        </p:attrNameLst>
-                                      </p:cBhvr>
-                                      <p:to>
-                                        <p:strVal val="visible"/>
-                                      </p:to>
-                                    </p:set>
-                                  </p:childTnLst>
-                                </p:cTn>
-                              </p:par>
-                              <p:par>
-                                <p:cTn id="99" presetID="1" presetClass="entr" presetSubtype="0" fill="hold" grpId="0" nodeType="withEffect">
-                                  <p:stCondLst>
-                                    <p:cond delay="0"/>
-                                  </p:stCondLst>
-                                  <p:childTnLst>
-                                    <p:set>
-                                      <p:cBhvr>
-                                        <p:cTn id="100" dur="1" fill="hold">
-                                          <p:stCondLst>
-                                            <p:cond delay="0"/>
-                                          </p:stCondLst>
-                                        </p:cTn>
-                                        <p:tgtEl>
-                                          <p:spTgt spid="93"/>
-                                        </p:tgtEl>
-                                        <p:attrNameLst>
-                                          <p:attrName>style.visibility</p:attrName>
-                                        </p:attrNameLst>
-                                      </p:cBhvr>
-                                      <p:to>
-                                        <p:strVal val="visible"/>
-                                      </p:to>
-                                    </p:set>
-                                  </p:childTnLst>
-                                </p:cTn>
-                              </p:par>
-                              <p:par>
-                                <p:cTn id="101" presetID="1" presetClass="entr" presetSubtype="0" fill="hold" grpId="0" nodeType="withEffect">
-                                  <p:stCondLst>
-                                    <p:cond delay="0"/>
-                                  </p:stCondLst>
-                                  <p:childTnLst>
-                                    <p:set>
-                                      <p:cBhvr>
-                                        <p:cTn id="102" dur="1" fill="hold">
-                                          <p:stCondLst>
-                                            <p:cond delay="0"/>
-                                          </p:stCondLst>
-                                        </p:cTn>
-                                        <p:tgtEl>
-                                          <p:spTgt spid="94"/>
-                                        </p:tgtEl>
-                                        <p:attrNameLst>
-                                          <p:attrName>style.visibility</p:attrName>
-                                        </p:attrNameLst>
-                                      </p:cBhvr>
-                                      <p:to>
-                                        <p:strVal val="visible"/>
-                                      </p:to>
-                                    </p:set>
-                                  </p:childTnLst>
-                                </p:cTn>
-                              </p:par>
-                              <p:par>
-                                <p:cTn id="103" presetID="1" presetClass="entr" presetSubtype="0" fill="hold" grpId="0" nodeType="withEffect">
-                                  <p:stCondLst>
-                                    <p:cond delay="0"/>
-                                  </p:stCondLst>
-                                  <p:childTnLst>
-                                    <p:set>
-                                      <p:cBhvr>
-                                        <p:cTn id="104" dur="1" fill="hold">
-                                          <p:stCondLst>
-                                            <p:cond delay="0"/>
-                                          </p:stCondLst>
-                                        </p:cTn>
-                                        <p:tgtEl>
-                                          <p:spTgt spid="95"/>
-                                        </p:tgtEl>
-                                        <p:attrNameLst>
-                                          <p:attrName>style.visibility</p:attrName>
-                                        </p:attrNameLst>
-                                      </p:cBhvr>
-                                      <p:to>
-                                        <p:strVal val="visible"/>
-                                      </p:to>
-                                    </p:set>
-                                  </p:childTnLst>
-                                </p:cTn>
-                              </p:par>
-                              <p:par>
-                                <p:cTn id="105" presetID="1" presetClass="entr" presetSubtype="0" fill="hold" nodeType="withEffect">
-                                  <p:stCondLst>
-                                    <p:cond delay="0"/>
-                                  </p:stCondLst>
-                                  <p:childTnLst>
-                                    <p:set>
-                                      <p:cBhvr>
-                                        <p:cTn id="106" dur="1" fill="hold">
-                                          <p:stCondLst>
-                                            <p:cond delay="0"/>
-                                          </p:stCondLst>
-                                        </p:cTn>
-                                        <p:tgtEl>
-                                          <p:spTgt spid="106"/>
-                                        </p:tgtEl>
-                                        <p:attrNameLst>
-                                          <p:attrName>style.visibility</p:attrName>
-                                        </p:attrNameLst>
-                                      </p:cBhvr>
-                                      <p:to>
-                                        <p:strVal val="visible"/>
-                                      </p:to>
-                                    </p:set>
-                                  </p:childTnLst>
-                                </p:cTn>
-                              </p:par>
-                              <p:par>
-                                <p:cTn id="107" presetID="1" presetClass="entr" presetSubtype="0" fill="hold" nodeType="withEffect">
-                                  <p:stCondLst>
-                                    <p:cond delay="0"/>
-                                  </p:stCondLst>
-                                  <p:childTnLst>
-                                    <p:set>
-                                      <p:cBhvr>
-                                        <p:cTn id="108" dur="1" fill="hold">
-                                          <p:stCondLst>
-                                            <p:cond delay="0"/>
-                                          </p:stCondLst>
-                                        </p:cTn>
-                                        <p:tgtEl>
-                                          <p:spTgt spid="108"/>
-                                        </p:tgtEl>
-                                        <p:attrNameLst>
-                                          <p:attrName>style.visibility</p:attrName>
-                                        </p:attrNameLst>
-                                      </p:cBhvr>
-                                      <p:to>
-                                        <p:strVal val="visible"/>
-                                      </p:to>
-                                    </p:set>
-                                  </p:childTnLst>
-                                </p:cTn>
-                              </p:par>
-                              <p:par>
-                                <p:cTn id="109" presetID="1" presetClass="entr" presetSubtype="0" fill="hold" nodeType="withEffect">
-                                  <p:stCondLst>
-                                    <p:cond delay="0"/>
-                                  </p:stCondLst>
-                                  <p:childTnLst>
-                                    <p:set>
-                                      <p:cBhvr>
-                                        <p:cTn id="110" dur="1" fill="hold">
-                                          <p:stCondLst>
-                                            <p:cond delay="0"/>
-                                          </p:stCondLst>
-                                        </p:cTn>
-                                        <p:tgtEl>
-                                          <p:spTgt spid="7"/>
-                                        </p:tgtEl>
-                                        <p:attrNameLst>
-                                          <p:attrName>style.visibility</p:attrName>
-                                        </p:attrNameLst>
-                                      </p:cBhvr>
-                                      <p:to>
-                                        <p:strVal val="visible"/>
-                                      </p:to>
-                                    </p:set>
-                                  </p:childTnLst>
-                                </p:cTn>
-                              </p:par>
-                              <p:par>
-                                <p:cTn id="111" presetID="1" presetClass="entr" presetSubtype="0" fill="hold" nodeType="withEffect">
-                                  <p:stCondLst>
-                                    <p:cond delay="0"/>
-                                  </p:stCondLst>
-                                  <p:childTnLst>
-                                    <p:set>
-                                      <p:cBhvr>
-                                        <p:cTn id="112" dur="1" fill="hold">
-                                          <p:stCondLst>
-                                            <p:cond delay="0"/>
-                                          </p:stCondLst>
-                                        </p:cTn>
-                                        <p:tgtEl>
-                                          <p:spTgt spid="9"/>
-                                        </p:tgtEl>
-                                        <p:attrNameLst>
-                                          <p:attrName>style.visibility</p:attrName>
-                                        </p:attrNameLst>
-                                      </p:cBhvr>
-                                      <p:to>
-                                        <p:strVal val="visible"/>
-                                      </p:to>
-                                    </p:set>
-                                  </p:childTnLst>
-                                </p:cTn>
-                              </p:par>
-                              <p:par>
-                                <p:cTn id="113" presetID="1" presetClass="entr" presetSubtype="0" fill="hold" nodeType="withEffect">
-                                  <p:stCondLst>
-                                    <p:cond delay="0"/>
-                                  </p:stCondLst>
-                                  <p:childTnLst>
-                                    <p:set>
-                                      <p:cBhvr>
-                                        <p:cTn id="114" dur="1" fill="hold">
-                                          <p:stCondLst>
-                                            <p:cond delay="0"/>
-                                          </p:stCondLst>
-                                        </p:cTn>
-                                        <p:tgtEl>
-                                          <p:spTgt spid="12"/>
-                                        </p:tgtEl>
-                                        <p:attrNameLst>
-                                          <p:attrName>style.visibility</p:attrName>
-                                        </p:attrNameLst>
-                                      </p:cBhvr>
-                                      <p:to>
-                                        <p:strVal val="visible"/>
-                                      </p:to>
-                                    </p:set>
-                                  </p:childTnLst>
-                                </p:cTn>
-                              </p:par>
-                              <p:par>
-                                <p:cTn id="115" presetID="1" presetClass="entr" presetSubtype="0" fill="hold" nodeType="withEffect">
-                                  <p:stCondLst>
-                                    <p:cond delay="0"/>
-                                  </p:stCondLst>
-                                  <p:childTnLst>
-                                    <p:set>
-                                      <p:cBhvr>
-                                        <p:cTn id="116" dur="1" fill="hold">
-                                          <p:stCondLst>
-                                            <p:cond delay="0"/>
-                                          </p:stCondLst>
-                                        </p:cTn>
-                                        <p:tgtEl>
-                                          <p:spTgt spid="18"/>
-                                        </p:tgtEl>
-                                        <p:attrNameLst>
-                                          <p:attrName>style.visibility</p:attrName>
-                                        </p:attrNameLst>
-                                      </p:cBhvr>
-                                      <p:to>
-                                        <p:strVal val="visible"/>
-                                      </p:to>
-                                    </p:set>
-                                  </p:childTnLst>
-                                </p:cTn>
-                              </p:par>
-                              <p:par>
-                                <p:cTn id="117" presetID="1" presetClass="entr" presetSubtype="0" fill="hold" nodeType="withEffect">
-                                  <p:stCondLst>
-                                    <p:cond delay="0"/>
-                                  </p:stCondLst>
-                                  <p:childTnLst>
-                                    <p:set>
-                                      <p:cBhvr>
-                                        <p:cTn id="118" dur="1" fill="hold">
-                                          <p:stCondLst>
-                                            <p:cond delay="0"/>
-                                          </p:stCondLst>
-                                        </p:cTn>
-                                        <p:tgtEl>
-                                          <p:spTgt spid="21"/>
-                                        </p:tgtEl>
-                                        <p:attrNameLst>
-                                          <p:attrName>style.visibility</p:attrName>
-                                        </p:attrNameLst>
-                                      </p:cBhvr>
-                                      <p:to>
-                                        <p:strVal val="visible"/>
-                                      </p:to>
-                                    </p:set>
-                                  </p:childTnLst>
-                                </p:cTn>
-                              </p:par>
-                              <p:par>
-                                <p:cTn id="119" presetID="1" presetClass="entr" presetSubtype="0" fill="hold" nodeType="withEffect">
-                                  <p:stCondLst>
-                                    <p:cond delay="0"/>
-                                  </p:stCondLst>
-                                  <p:childTnLst>
-                                    <p:set>
-                                      <p:cBhvr>
-                                        <p:cTn id="120" dur="1" fill="hold">
-                                          <p:stCondLst>
-                                            <p:cond delay="0"/>
-                                          </p:stCondLst>
-                                        </p:cTn>
-                                        <p:tgtEl>
-                                          <p:spTgt spid="38"/>
-                                        </p:tgtEl>
-                                        <p:attrNameLst>
-                                          <p:attrName>style.visibility</p:attrName>
-                                        </p:attrNameLst>
-                                      </p:cBhvr>
-                                      <p:to>
-                                        <p:strVal val="visible"/>
-                                      </p:to>
-                                    </p:set>
-                                  </p:childTnLst>
-                                </p:cTn>
-                              </p:par>
-                              <p:par>
-                                <p:cTn id="121" presetID="1" presetClass="entr" presetSubtype="0" fill="hold" nodeType="withEffect">
-                                  <p:stCondLst>
-                                    <p:cond delay="0"/>
-                                  </p:stCondLst>
-                                  <p:childTnLst>
-                                    <p:set>
-                                      <p:cBhvr>
-                                        <p:cTn id="122" dur="1" fill="hold">
-                                          <p:stCondLst>
-                                            <p:cond delay="0"/>
-                                          </p:stCondLst>
-                                        </p:cTn>
-                                        <p:tgtEl>
-                                          <p:spTgt spid="42"/>
-                                        </p:tgtEl>
-                                        <p:attrNameLst>
-                                          <p:attrName>style.visibility</p:attrName>
-                                        </p:attrNameLst>
-                                      </p:cBhvr>
-                                      <p:to>
-                                        <p:strVal val="visible"/>
-                                      </p:to>
-                                    </p:set>
-                                  </p:childTnLst>
-                                </p:cTn>
-                              </p:par>
-                            </p:childTnLst>
-                          </p:cTn>
-                        </p:par>
-                      </p:childTnLst>
-                    </p:cTn>
-                  </p:par>
-                </p:childTnLst>
-              </p:cTn>
-              <p:prevCondLst>
-                <p:cond evt="onPrev" delay="0">
-                  <p:tgtEl>
-                    <p:sldTgt/>
-                  </p:tgtEl>
-                </p:cond>
-              </p:prevCondLst>
-              <p:nextCondLst>
-                <p:cond evt="onNext" delay="0">
-                  <p:tgtEl>
-                    <p:sldTgt/>
-                  </p:tgtEl>
-                </p:cond>
-              </p:nextCondLst>
-            </p:seq>
-          </p:childTnLst>
-        </p:cTn>
-      </p:par>
-    </p:tnLst>
-    <p:bldLst>
-      <p:bldP spid="24" grpId="0" animBg="1"/>
-      <p:bldP spid="25" grpId="0" animBg="1"/>
-      <p:bldP spid="26" grpId="0" animBg="1"/>
-      <p:bldP spid="27" grpId="0" animBg="1"/>
-      <p:bldP spid="28" grpId="0" animBg="1"/>
-      <p:bldP spid="29" grpId="0" animBg="1"/>
-      <p:bldP spid="30" grpId="0" animBg="1"/>
-      <p:bldP spid="31" grpId="0" animBg="1"/>
-      <p:bldP spid="32" grpId="0" animBg="1"/>
-      <p:bldP spid="33" grpId="0" animBg="1"/>
-      <p:bldP spid="34" grpId="0" animBg="1"/>
-      <p:bldP spid="35" grpId="0" animBg="1"/>
-      <p:bldP spid="36" grpId="0" animBg="1"/>
-      <p:bldP spid="37" grpId="0" animBg="1"/>
-      <p:bldP spid="54" grpId="0"/>
-      <p:bldP spid="55" grpId="0"/>
-      <p:bldP spid="46" grpId="0" animBg="1"/>
-      <p:bldP spid="47" grpId="0" animBg="1"/>
-      <p:bldP spid="49" grpId="0" animBg="1"/>
-      <p:bldP spid="51" grpId="0" animBg="1"/>
-      <p:bldP spid="52" grpId="0" animBg="1"/>
-      <p:bldP spid="57" grpId="0" animBg="1"/>
-      <p:bldP spid="58" grpId="0" animBg="1"/>
-      <p:bldP spid="59" grpId="0" animBg="1"/>
-      <p:bldP spid="60" grpId="0" animBg="1"/>
-      <p:bldP spid="61" grpId="0" animBg="1"/>
-      <p:bldP spid="62" grpId="0" animBg="1"/>
-      <p:bldP spid="63" grpId="0" animBg="1"/>
-      <p:bldP spid="64" grpId="0" animBg="1"/>
-      <p:bldP spid="65" grpId="0" animBg="1"/>
-      <p:bldP spid="80" grpId="0" animBg="1"/>
-      <p:bldP spid="81" grpId="0" animBg="1"/>
-      <p:bldP spid="82" grpId="0" animBg="1"/>
-      <p:bldP spid="83" grpId="0" animBg="1"/>
-      <p:bldP spid="84" grpId="0" animBg="1"/>
-      <p:bldP spid="85" grpId="0" animBg="1"/>
-      <p:bldP spid="86" grpId="0" animBg="1"/>
-      <p:bldP spid="87" grpId="0" animBg="1"/>
-      <p:bldP spid="88" grpId="0" animBg="1"/>
-      <p:bldP spid="89" grpId="0" animBg="1"/>
-      <p:bldP spid="90" grpId="0" animBg="1"/>
-      <p:bldP spid="91" grpId="0" animBg="1"/>
-      <p:bldP spid="92" grpId="0" animBg="1"/>
-      <p:bldP spid="93" grpId="0" animBg="1"/>
-      <p:bldP spid="94" grpId="0"/>
-      <p:bldP spid="95" grpId="0"/>
-    </p:bldLst>
-  </p:timing>
 </p:sld>
 </file>
 
@@ -11144,8 +9830,8 @@
         </p:nvSpPr>
         <p:spPr>
           <a:xfrm>
-            <a:off x="9037066" y="1366625"/>
-            <a:ext cx="1776845" cy="276999"/>
+            <a:off x="10744198" y="1273106"/>
+            <a:ext cx="1129584" cy="461665"/>
           </a:xfrm>
           <a:prstGeom prst="rect">
             <a:avLst/>
@@ -11184,7 +9870,7 @@
         </p:nvSpPr>
         <p:spPr>
           <a:xfrm>
-            <a:off x="10993202" y="1280792"/>
+            <a:off x="9621599" y="1270401"/>
             <a:ext cx="768294" cy="461665"/>
           </a:xfrm>
           <a:prstGeom prst="rect">
@@ -11205,7 +9891,7 @@
           <a:p>
             <a:r>
               <a:rPr lang="en-US" sz="1200" dirty="0"/>
-              <a:t>4. Heat transport</a:t>
+              <a:t>5. Heat transport</a:t>
             </a:r>
           </a:p>
         </p:txBody>
@@ -11242,8 +9928,12 @@
           <a:lstStyle/>
           <a:p>
             <a:r>
+              <a:rPr lang="en-US" sz="1200" dirty="0" err="1"/>
+              <a:t>Perple_x</a:t>
+            </a:r>
+            <a:r>
               <a:rPr lang="en-US" sz="1200" dirty="0"/>
-              <a:t>Perplex: Rock Equilibration</a:t>
+              <a:t>: Rock Equilibration</a:t>
             </a:r>
           </a:p>
         </p:txBody>
@@ -11305,7 +9995,7 @@
         <p:spPr>
           <a:xfrm>
             <a:off x="1023679" y="4197929"/>
-            <a:ext cx="6182618" cy="0"/>
+            <a:ext cx="3805652" cy="19824"/>
           </a:xfrm>
           <a:prstGeom prst="line">
             <a:avLst/>
@@ -11348,7 +10038,7 @@
         <p:spPr>
           <a:xfrm>
             <a:off x="1023679" y="3200401"/>
-            <a:ext cx="6182618" cy="0"/>
+            <a:ext cx="3805652" cy="0"/>
           </a:xfrm>
           <a:prstGeom prst="line">
             <a:avLst/>
@@ -11545,14 +10235,14 @@
           <p:cNvCxnSpPr>
             <a:cxnSpLocks/>
             <a:stCxn id="30" idx="3"/>
-            <a:endCxn id="105" idx="1"/>
+            <a:endCxn id="115" idx="1"/>
           </p:cNvCxnSpPr>
           <p:nvPr/>
         </p:nvCxnSpPr>
         <p:spPr>
           <a:xfrm flipV="1">
-            <a:off x="4708941" y="1497500"/>
-            <a:ext cx="210997" cy="6526"/>
+            <a:off x="4708941" y="1497412"/>
+            <a:ext cx="660699" cy="6614"/>
           </a:xfrm>
           <a:prstGeom prst="straightConnector1">
             <a:avLst/>
@@ -11590,15 +10280,15 @@
           </p:cNvPr>
           <p:cNvCxnSpPr>
             <a:cxnSpLocks/>
-            <a:stCxn id="24" idx="3"/>
-            <a:endCxn id="26" idx="1"/>
+            <a:stCxn id="26" idx="3"/>
+            <a:endCxn id="24" idx="1"/>
           </p:cNvCxnSpPr>
           <p:nvPr/>
         </p:nvCxnSpPr>
         <p:spPr>
           <a:xfrm>
-            <a:off x="10813911" y="1505125"/>
-            <a:ext cx="179291" cy="6500"/>
+            <a:off x="10389893" y="1501234"/>
+            <a:ext cx="354305" cy="2705"/>
           </a:xfrm>
           <a:prstGeom prst="straightConnector1">
             <a:avLst/>
@@ -11636,21 +10326,21 @@
           </p:cNvPr>
           <p:cNvCxnSpPr>
             <a:cxnSpLocks/>
-            <a:stCxn id="26" idx="3"/>
+            <a:stCxn id="24" idx="3"/>
             <a:endCxn id="23" idx="1"/>
           </p:cNvCxnSpPr>
           <p:nvPr/>
         </p:nvCxnSpPr>
         <p:spPr>
           <a:xfrm flipH="1">
-            <a:off x="998961" y="1511625"/>
-            <a:ext cx="10762535" cy="12700"/>
+            <a:off x="998961" y="1503939"/>
+            <a:ext cx="10874821" cy="7686"/>
           </a:xfrm>
           <a:prstGeom prst="bentConnector5">
             <a:avLst>
-              <a:gd name="adj1" fmla="val -2124"/>
-              <a:gd name="adj2" fmla="val 3617583"/>
-              <a:gd name="adj3" fmla="val 102124"/>
+              <a:gd name="adj1" fmla="val -2102"/>
+              <a:gd name="adj2" fmla="val 5977518"/>
+              <a:gd name="adj3" fmla="val 102102"/>
             </a:avLst>
           </a:prstGeom>
           <a:ln w="28575">
@@ -11715,7 +10405,19 @@
               <a:rPr lang="en-US" sz="700" dirty="0">
                 <a:latin typeface="Courier" pitchFamily="2" charset="0"/>
               </a:rPr>
-              <a:t>Cell[0].Heat()</a:t>
+              <a:t>Cell[0].</a:t>
+            </a:r>
+            <a:r>
+              <a:rPr lang="en-US" sz="700" dirty="0" err="1">
+                <a:latin typeface="Courier" pitchFamily="2" charset="0"/>
+              </a:rPr>
+              <a:t>cell_heat</a:t>
+            </a:r>
+            <a:r>
+              <a:rPr lang="en-US" sz="700" dirty="0">
+                <a:latin typeface="Courier" pitchFamily="2" charset="0"/>
+              </a:rPr>
+              <a:t>()</a:t>
             </a:r>
           </a:p>
         </p:txBody>
@@ -11753,9 +10455,10 @@
           </a:bodyPr>
           <a:lstStyle/>
           <a:p>
+            <a:pPr algn="ctr"/>
             <a:r>
               <a:rPr lang="en-US" sz="1200" dirty="0"/>
-              <a:t>Frezchem: ice equilibration</a:t>
+              <a:t>ice equilibration</a:t>
             </a:r>
           </a:p>
         </p:txBody>
@@ -11774,7 +10477,7 @@
         </p:nvSpPr>
         <p:spPr>
           <a:xfrm>
-            <a:off x="7265450" y="4831886"/>
+            <a:off x="5384689" y="4831886"/>
             <a:ext cx="1776845" cy="276999"/>
           </a:xfrm>
           <a:prstGeom prst="rect">
@@ -11815,7 +10518,7 @@
         </p:nvCxnSpPr>
         <p:spPr>
           <a:xfrm flipV="1">
-            <a:off x="8121364" y="4312229"/>
+            <a:off x="6240603" y="4312229"/>
             <a:ext cx="0" cy="498764"/>
           </a:xfrm>
           <a:prstGeom prst="straightConnector1">
@@ -11857,7 +10560,7 @@
         </p:nvSpPr>
         <p:spPr>
           <a:xfrm>
-            <a:off x="4981580" y="3274688"/>
+            <a:off x="7246799" y="3274688"/>
             <a:ext cx="1776845" cy="830997"/>
           </a:xfrm>
           <a:prstGeom prst="rect">
@@ -11939,15 +10642,15 @@
             <a:pPr algn="l"/>
             <a:r>
               <a:rPr lang="en-US" sz="4400" dirty="0"/>
-              <a:t>Main program loop (</a:t>
+              <a:t>Main program loop: </a:t>
             </a:r>
             <a:r>
               <a:rPr lang="en-US" sz="4400" dirty="0" err="1"/>
-              <a:t>Time_step</a:t>
+              <a:t>timeStep</a:t>
             </a:r>
             <a:r>
               <a:rPr lang="en-US" sz="4400" dirty="0"/>
-              <a:t> function)</a:t>
+              <a:t>()</a:t>
             </a:r>
           </a:p>
         </p:txBody>
@@ -12016,7 +10719,7 @@
         </p:nvCxnSpPr>
         <p:spPr>
           <a:xfrm>
-            <a:off x="8121364" y="2947580"/>
+            <a:off x="6261385" y="2937189"/>
             <a:ext cx="0" cy="348431"/>
           </a:xfrm>
           <a:prstGeom prst="straightConnector1">
@@ -12058,7 +10761,7 @@
         </p:nvSpPr>
         <p:spPr>
           <a:xfrm rot="334715">
-            <a:off x="7256194" y="2784902"/>
+            <a:off x="5375433" y="2784902"/>
             <a:ext cx="1776845" cy="276999"/>
           </a:xfrm>
           <a:prstGeom prst="rect">
@@ -12099,7 +10802,7 @@
         </p:nvSpPr>
         <p:spPr>
           <a:xfrm>
-            <a:off x="9234328" y="5406831"/>
+            <a:off x="6948319" y="5406831"/>
             <a:ext cx="259772" cy="249382"/>
           </a:xfrm>
           <a:prstGeom prst="rect">
@@ -12156,7 +10859,7 @@
         </p:nvSpPr>
         <p:spPr>
           <a:xfrm>
-            <a:off x="9234328" y="5157449"/>
+            <a:off x="6948319" y="5157449"/>
             <a:ext cx="259772" cy="249382"/>
           </a:xfrm>
           <a:prstGeom prst="rect">
@@ -12213,7 +10916,7 @@
         </p:nvSpPr>
         <p:spPr>
           <a:xfrm>
-            <a:off x="9234328" y="4908067"/>
+            <a:off x="6948319" y="4908067"/>
             <a:ext cx="259772" cy="249382"/>
           </a:xfrm>
           <a:prstGeom prst="rect">
@@ -12270,7 +10973,7 @@
         </p:nvSpPr>
         <p:spPr>
           <a:xfrm>
-            <a:off x="9234328" y="4658685"/>
+            <a:off x="6948319" y="4658685"/>
             <a:ext cx="259772" cy="249382"/>
           </a:xfrm>
           <a:prstGeom prst="rect">
@@ -12327,7 +11030,7 @@
         </p:nvSpPr>
         <p:spPr>
           <a:xfrm>
-            <a:off x="9234328" y="4409303"/>
+            <a:off x="6948319" y="4409303"/>
             <a:ext cx="259772" cy="249382"/>
           </a:xfrm>
           <a:prstGeom prst="rect">
@@ -12384,7 +11087,7 @@
         </p:nvSpPr>
         <p:spPr>
           <a:xfrm>
-            <a:off x="9234328" y="4159921"/>
+            <a:off x="6948319" y="4159921"/>
             <a:ext cx="259772" cy="249382"/>
           </a:xfrm>
           <a:prstGeom prst="rect">
@@ -12441,7 +11144,7 @@
         </p:nvSpPr>
         <p:spPr>
           <a:xfrm>
-            <a:off x="9234328" y="3920930"/>
+            <a:off x="6948319" y="3920930"/>
             <a:ext cx="259772" cy="249382"/>
           </a:xfrm>
           <a:prstGeom prst="rect">
@@ -12495,7 +11198,7 @@
         </p:nvSpPr>
         <p:spPr>
           <a:xfrm>
-            <a:off x="9234328" y="3671548"/>
+            <a:off x="6948319" y="3671548"/>
             <a:ext cx="259772" cy="249382"/>
           </a:xfrm>
           <a:prstGeom prst="rect">
@@ -12549,7 +11252,7 @@
         </p:nvSpPr>
         <p:spPr>
           <a:xfrm>
-            <a:off x="9234328" y="3422166"/>
+            <a:off x="6948319" y="3422166"/>
             <a:ext cx="259772" cy="249382"/>
           </a:xfrm>
           <a:prstGeom prst="rect">
@@ -12603,7 +11306,7 @@
         </p:nvSpPr>
         <p:spPr>
           <a:xfrm>
-            <a:off x="9234328" y="3172784"/>
+            <a:off x="6948319" y="3172784"/>
             <a:ext cx="259772" cy="249382"/>
           </a:xfrm>
           <a:prstGeom prst="rect">
@@ -12660,7 +11363,7 @@
         </p:nvSpPr>
         <p:spPr>
           <a:xfrm>
-            <a:off x="9234328" y="2923402"/>
+            <a:off x="6948319" y="2923402"/>
             <a:ext cx="259772" cy="249382"/>
           </a:xfrm>
           <a:prstGeom prst="rect">
@@ -12717,7 +11420,7 @@
         </p:nvSpPr>
         <p:spPr>
           <a:xfrm>
-            <a:off x="9234328" y="2663628"/>
+            <a:off x="6948319" y="2663628"/>
             <a:ext cx="259772" cy="249382"/>
           </a:xfrm>
           <a:prstGeom prst="rect">
@@ -12774,7 +11477,7 @@
         </p:nvSpPr>
         <p:spPr>
           <a:xfrm>
-            <a:off x="9234328" y="2403852"/>
+            <a:off x="6948319" y="2403852"/>
             <a:ext cx="259772" cy="249382"/>
           </a:xfrm>
           <a:prstGeom prst="rect">
@@ -12831,7 +11534,7 @@
         </p:nvSpPr>
         <p:spPr>
           <a:xfrm>
-            <a:off x="9234328" y="5656213"/>
+            <a:off x="6948319" y="5656213"/>
             <a:ext cx="259772" cy="249382"/>
           </a:xfrm>
           <a:prstGeom prst="rect">
@@ -12890,7 +11593,7 @@
         </p:nvCxnSpPr>
         <p:spPr>
           <a:xfrm>
-            <a:off x="7206297" y="2130251"/>
+            <a:off x="5335933" y="2130251"/>
             <a:ext cx="0" cy="3899365"/>
           </a:xfrm>
           <a:prstGeom prst="line">
@@ -12931,7 +11634,7 @@
         </p:nvSpPr>
         <p:spPr>
           <a:xfrm>
-            <a:off x="6910673" y="5420022"/>
+            <a:off x="5040309" y="5420022"/>
             <a:ext cx="259772" cy="249382"/>
           </a:xfrm>
           <a:prstGeom prst="rect">
@@ -12988,7 +11691,7 @@
         </p:nvSpPr>
         <p:spPr>
           <a:xfrm>
-            <a:off x="6910673" y="5170640"/>
+            <a:off x="5040309" y="5170640"/>
             <a:ext cx="259772" cy="249382"/>
           </a:xfrm>
           <a:prstGeom prst="rect">
@@ -13045,7 +11748,7 @@
         </p:nvSpPr>
         <p:spPr>
           <a:xfrm>
-            <a:off x="6910673" y="4921258"/>
+            <a:off x="5040309" y="4921258"/>
             <a:ext cx="259772" cy="249382"/>
           </a:xfrm>
           <a:prstGeom prst="rect">
@@ -13102,7 +11805,7 @@
         </p:nvSpPr>
         <p:spPr>
           <a:xfrm>
-            <a:off x="6910673" y="4671876"/>
+            <a:off x="5040309" y="4671876"/>
             <a:ext cx="259772" cy="249382"/>
           </a:xfrm>
           <a:prstGeom prst="rect">
@@ -13159,7 +11862,7 @@
         </p:nvSpPr>
         <p:spPr>
           <a:xfrm>
-            <a:off x="6910673" y="4422494"/>
+            <a:off x="5040309" y="4422494"/>
             <a:ext cx="259772" cy="249382"/>
           </a:xfrm>
           <a:prstGeom prst="rect">
@@ -13216,7 +11919,7 @@
         </p:nvSpPr>
         <p:spPr>
           <a:xfrm>
-            <a:off x="6910673" y="4173112"/>
+            <a:off x="5040309" y="4173112"/>
             <a:ext cx="259772" cy="249382"/>
           </a:xfrm>
           <a:prstGeom prst="rect">
@@ -13273,7 +11976,7 @@
         </p:nvSpPr>
         <p:spPr>
           <a:xfrm>
-            <a:off x="6910673" y="3934121"/>
+            <a:off x="5040309" y="3934121"/>
             <a:ext cx="259772" cy="249382"/>
           </a:xfrm>
           <a:prstGeom prst="rect">
@@ -13327,7 +12030,7 @@
         </p:nvSpPr>
         <p:spPr>
           <a:xfrm>
-            <a:off x="6910673" y="3684739"/>
+            <a:off x="5040309" y="3684739"/>
             <a:ext cx="259772" cy="249382"/>
           </a:xfrm>
           <a:prstGeom prst="rect">
@@ -13381,7 +12084,7 @@
         </p:nvSpPr>
         <p:spPr>
           <a:xfrm>
-            <a:off x="6910673" y="3435357"/>
+            <a:off x="5040309" y="3435357"/>
             <a:ext cx="259772" cy="249382"/>
           </a:xfrm>
           <a:prstGeom prst="rect">
@@ -13435,7 +12138,7 @@
         </p:nvSpPr>
         <p:spPr>
           <a:xfrm>
-            <a:off x="6910673" y="3185975"/>
+            <a:off x="5040309" y="3185975"/>
             <a:ext cx="259772" cy="249382"/>
           </a:xfrm>
           <a:prstGeom prst="rect">
@@ -13489,7 +12192,7 @@
         </p:nvSpPr>
         <p:spPr>
           <a:xfrm>
-            <a:off x="6910673" y="2936593"/>
+            <a:off x="5040309" y="2936593"/>
             <a:ext cx="259772" cy="249382"/>
           </a:xfrm>
           <a:prstGeom prst="rect">
@@ -13546,7 +12249,7 @@
         </p:nvSpPr>
         <p:spPr>
           <a:xfrm>
-            <a:off x="6910673" y="2676819"/>
+            <a:off x="5040309" y="2676819"/>
             <a:ext cx="259772" cy="249382"/>
           </a:xfrm>
           <a:prstGeom prst="rect">
@@ -13603,7 +12306,7 @@
         </p:nvSpPr>
         <p:spPr>
           <a:xfrm>
-            <a:off x="6910673" y="2417043"/>
+            <a:off x="5040309" y="2417043"/>
             <a:ext cx="259772" cy="249382"/>
           </a:xfrm>
           <a:prstGeom prst="rect">
@@ -13660,7 +12363,7 @@
         </p:nvSpPr>
         <p:spPr>
           <a:xfrm>
-            <a:off x="6910673" y="5669404"/>
+            <a:off x="5040309" y="5669404"/>
             <a:ext cx="259772" cy="249382"/>
           </a:xfrm>
           <a:prstGeom prst="rect">
@@ -13743,7 +12446,19 @@
               <a:rPr lang="en-US" sz="700" dirty="0">
                 <a:latin typeface="Courier" pitchFamily="2" charset="0"/>
               </a:rPr>
-              <a:t>Cell[1].Heat()</a:t>
+              <a:t>Cell[1].</a:t>
+            </a:r>
+            <a:r>
+              <a:rPr lang="en-US" sz="700" dirty="0" err="1">
+                <a:latin typeface="Courier" pitchFamily="2" charset="0"/>
+              </a:rPr>
+              <a:t>cell_heat</a:t>
+            </a:r>
+            <a:r>
+              <a:rPr lang="en-US" sz="700" dirty="0">
+                <a:latin typeface="Courier" pitchFamily="2" charset="0"/>
+              </a:rPr>
+              <a:t>()</a:t>
             </a:r>
           </a:p>
         </p:txBody>
@@ -13829,7 +12544,19 @@
               <a:rPr lang="en-US" sz="700" dirty="0">
                 <a:latin typeface="Courier" pitchFamily="2" charset="0"/>
               </a:rPr>
-              <a:t>Cell[nr].Heat()</a:t>
+              <a:t>Cell[nr].</a:t>
+            </a:r>
+            <a:r>
+              <a:rPr lang="en-US" sz="700" dirty="0" err="1">
+                <a:latin typeface="Courier" pitchFamily="2" charset="0"/>
+              </a:rPr>
+              <a:t>cell_heat</a:t>
+            </a:r>
+            <a:r>
+              <a:rPr lang="en-US" sz="700" dirty="0">
+                <a:latin typeface="Courier" pitchFamily="2" charset="0"/>
+              </a:rPr>
+              <a:t>()</a:t>
             </a:r>
           </a:p>
         </p:txBody>
@@ -13915,7 +12642,19 @@
               <a:rPr lang="en-US" sz="700" dirty="0">
                 <a:latin typeface="Courier" pitchFamily="2" charset="0"/>
               </a:rPr>
-              <a:t>Cell[0].equilibrate()</a:t>
+              <a:t>Cell[0].</a:t>
+            </a:r>
+            <a:r>
+              <a:rPr lang="en-US" sz="700" dirty="0" err="1">
+                <a:latin typeface="Courier" pitchFamily="2" charset="0"/>
+              </a:rPr>
+              <a:t>cell_equilibrate</a:t>
+            </a:r>
+            <a:r>
+              <a:rPr lang="en-US" sz="700" dirty="0">
+                <a:latin typeface="Courier" pitchFamily="2" charset="0"/>
+              </a:rPr>
+              <a:t>()</a:t>
             </a:r>
           </a:p>
         </p:txBody>
@@ -13936,7 +12675,7 @@
         </p:nvCxnSpPr>
         <p:spPr>
           <a:xfrm>
-            <a:off x="10813911" y="2138545"/>
+            <a:off x="10710002" y="2138545"/>
             <a:ext cx="0" cy="3899365"/>
           </a:xfrm>
           <a:prstGeom prst="line">
@@ -13977,7 +12716,7 @@
         </p:nvSpPr>
         <p:spPr>
           <a:xfrm>
-            <a:off x="10276457" y="3413906"/>
+            <a:off x="8676253" y="3413906"/>
             <a:ext cx="2823007" cy="830997"/>
           </a:xfrm>
           <a:prstGeom prst="rect">
@@ -14063,7 +12802,19 @@
               <a:rPr lang="en-US" sz="700" dirty="0">
                 <a:latin typeface="Courier" pitchFamily="2" charset="0"/>
               </a:rPr>
-              <a:t>Cell[1].equilibrate()</a:t>
+              <a:t>Cell[1].</a:t>
+            </a:r>
+            <a:r>
+              <a:rPr lang="en-US" sz="700" dirty="0" err="1">
+                <a:latin typeface="Courier" pitchFamily="2" charset="0"/>
+              </a:rPr>
+              <a:t>cell_equilibrate</a:t>
+            </a:r>
+            <a:r>
+              <a:rPr lang="en-US" sz="700" dirty="0">
+                <a:latin typeface="Courier" pitchFamily="2" charset="0"/>
+              </a:rPr>
+              <a:t>()</a:t>
             </a:r>
           </a:p>
         </p:txBody>
@@ -14108,7 +12859,19 @@
               <a:rPr lang="en-US" sz="700" dirty="0">
                 <a:latin typeface="Courier" pitchFamily="2" charset="0"/>
               </a:rPr>
-              <a:t>Cell[nr].equilibrate()</a:t>
+              <a:t>Cell[nr].</a:t>
+            </a:r>
+            <a:r>
+              <a:rPr lang="en-US" sz="700" dirty="0" err="1">
+                <a:latin typeface="Courier" pitchFamily="2" charset="0"/>
+              </a:rPr>
+              <a:t>cell_equilibrate</a:t>
+            </a:r>
+            <a:r>
+              <a:rPr lang="en-US" sz="700" dirty="0">
+                <a:latin typeface="Courier" pitchFamily="2" charset="0"/>
+              </a:rPr>
+              <a:t>()</a:t>
             </a:r>
           </a:p>
         </p:txBody>
@@ -14127,7 +12890,7 @@
         </p:nvSpPr>
         <p:spPr>
           <a:xfrm rot="5400000">
-            <a:off x="10021045" y="3804538"/>
+            <a:off x="8441623" y="3804538"/>
             <a:ext cx="2136972" cy="253916"/>
           </a:xfrm>
           <a:prstGeom prst="rect">
@@ -14150,10 +12913,16 @@
           <a:p>
             <a:pPr algn="ctr"/>
             <a:r>
+              <a:rPr lang="en-US" sz="1050" dirty="0" err="1">
+                <a:latin typeface="Courier" pitchFamily="2" charset="0"/>
+              </a:rPr>
+              <a:t>Planet.TransferHeat</a:t>
+            </a:r>
+            <a:r>
               <a:rPr lang="en-US" sz="1050" dirty="0">
                 <a:latin typeface="Courier" pitchFamily="2" charset="0"/>
               </a:rPr>
-              <a:t>Planet.Heat_Transport()</a:t>
+              <a:t>()</a:t>
             </a:r>
           </a:p>
         </p:txBody>
@@ -14174,8 +12943,8 @@
         </p:nvCxnSpPr>
         <p:spPr>
           <a:xfrm>
-            <a:off x="7175853" y="3200401"/>
-            <a:ext cx="2279536" cy="213505"/>
+            <a:off x="5295092" y="3200401"/>
+            <a:ext cx="1866442" cy="228599"/>
           </a:xfrm>
           <a:prstGeom prst="line">
             <a:avLst/>
@@ -14217,8 +12986,8 @@
         </p:nvCxnSpPr>
         <p:spPr>
           <a:xfrm flipV="1">
-            <a:off x="7188173" y="4183055"/>
-            <a:ext cx="2267216" cy="34698"/>
+            <a:off x="5328194" y="4183143"/>
+            <a:ext cx="1833340" cy="34610"/>
           </a:xfrm>
           <a:prstGeom prst="line">
             <a:avLst/>
@@ -14258,7 +13027,7 @@
         </p:nvSpPr>
         <p:spPr>
           <a:xfrm rot="5400000">
-            <a:off x="6242738" y="3518573"/>
+            <a:off x="4372374" y="3518573"/>
             <a:ext cx="2374994" cy="253916"/>
           </a:xfrm>
           <a:prstGeom prst="rect">
@@ -14281,10 +13050,16 @@
           <a:p>
             <a:pPr algn="ctr"/>
             <a:r>
+              <a:rPr lang="en-US" sz="1050" dirty="0" err="1">
+                <a:latin typeface="Courier" pitchFamily="2" charset="0"/>
+              </a:rPr>
+              <a:t>Planet.transportMaterial</a:t>
+            </a:r>
+            <a:r>
               <a:rPr lang="en-US" sz="1050" dirty="0">
                 <a:latin typeface="Courier" pitchFamily="2" charset="0"/>
               </a:rPr>
-              <a:t>Planet.Material_Transport()</a:t>
+              <a:t>()</a:t>
             </a:r>
           </a:p>
         </p:txBody>
@@ -14303,8 +13078,8 @@
         </p:nvSpPr>
         <p:spPr>
           <a:xfrm>
-            <a:off x="4967117" y="5695317"/>
-            <a:ext cx="1630909" cy="199938"/>
+            <a:off x="7232336" y="5695317"/>
+            <a:ext cx="1733412" cy="200055"/>
           </a:xfrm>
           <a:prstGeom prst="rect">
             <a:avLst/>
@@ -14329,7 +13104,19 @@
               <a:rPr lang="en-US" sz="700" dirty="0">
                 <a:latin typeface="Courier" pitchFamily="2" charset="0"/>
               </a:rPr>
-              <a:t>Cell[0].update_Prop()</a:t>
+              <a:t>Cell[0]. </a:t>
+            </a:r>
+            <a:r>
+              <a:rPr lang="en-US" sz="700" dirty="0" err="1">
+                <a:latin typeface="Courier" pitchFamily="2" charset="0"/>
+              </a:rPr>
+              <a:t>cell_update_props</a:t>
+            </a:r>
+            <a:r>
+              <a:rPr lang="en-US" sz="700" dirty="0">
+                <a:latin typeface="Courier" pitchFamily="2" charset="0"/>
+              </a:rPr>
+              <a:t>()</a:t>
             </a:r>
           </a:p>
         </p:txBody>
@@ -14348,8 +13135,8 @@
         </p:nvSpPr>
         <p:spPr>
           <a:xfrm>
-            <a:off x="4956743" y="5434449"/>
-            <a:ext cx="1630909" cy="199938"/>
+            <a:off x="7221962" y="5434449"/>
+            <a:ext cx="1733412" cy="200055"/>
           </a:xfrm>
           <a:prstGeom prst="rect">
             <a:avLst/>
@@ -14374,7 +13161,19 @@
               <a:rPr lang="en-US" sz="700" dirty="0">
                 <a:latin typeface="Courier" pitchFamily="2" charset="0"/>
               </a:rPr>
-              <a:t>Cell[1].update_Prop()</a:t>
+              <a:t>Cell[1]. </a:t>
+            </a:r>
+            <a:r>
+              <a:rPr lang="en-US" sz="700" dirty="0" err="1">
+                <a:latin typeface="Courier" pitchFamily="2" charset="0"/>
+              </a:rPr>
+              <a:t>cell_update_props</a:t>
+            </a:r>
+            <a:r>
+              <a:rPr lang="en-US" sz="700" dirty="0">
+                <a:latin typeface="Courier" pitchFamily="2" charset="0"/>
+              </a:rPr>
+              <a:t>()</a:t>
             </a:r>
           </a:p>
         </p:txBody>
@@ -14393,8 +13192,8 @@
         </p:nvSpPr>
         <p:spPr>
           <a:xfrm>
-            <a:off x="4967117" y="2431411"/>
-            <a:ext cx="1630909" cy="199938"/>
+            <a:off x="7232336" y="2431411"/>
+            <a:ext cx="1776842" cy="200055"/>
           </a:xfrm>
           <a:prstGeom prst="rect">
             <a:avLst/>
@@ -14419,7 +13218,19 @@
               <a:rPr lang="en-US" sz="700" dirty="0">
                 <a:latin typeface="Courier" pitchFamily="2" charset="0"/>
               </a:rPr>
-              <a:t>Cell[nr].update_Prop()</a:t>
+              <a:t>Cell[nr].</a:t>
+            </a:r>
+            <a:r>
+              <a:rPr lang="en-US" sz="700" dirty="0" err="1">
+                <a:latin typeface="Courier" pitchFamily="2" charset="0"/>
+              </a:rPr>
+              <a:t>cell_update_props</a:t>
+            </a:r>
+            <a:r>
+              <a:rPr lang="en-US" sz="700" dirty="0">
+                <a:latin typeface="Courier" pitchFamily="2" charset="0"/>
+              </a:rPr>
+              <a:t>()</a:t>
             </a:r>
           </a:p>
         </p:txBody>
@@ -14526,7 +13337,7 @@
         </p:nvSpPr>
         <p:spPr>
           <a:xfrm>
-            <a:off x="4919938" y="1359000"/>
+            <a:off x="7237109" y="1359000"/>
             <a:ext cx="1776845" cy="276999"/>
           </a:xfrm>
           <a:prstGeom prst="rect">
@@ -14547,7 +13358,7 @@
           <a:p>
             <a:r>
               <a:rPr lang="en-US" sz="1200" dirty="0"/>
-              <a:t>3. Update Cell Properties</a:t>
+              <a:t>4. Update Cell Properties</a:t>
             </a:r>
           </a:p>
         </p:txBody>
@@ -14564,14 +13375,14 @@
           <p:cNvCxnSpPr>
             <a:cxnSpLocks/>
             <a:stCxn id="105" idx="3"/>
-            <a:endCxn id="115" idx="1"/>
+            <a:endCxn id="26" idx="1"/>
           </p:cNvCxnSpPr>
           <p:nvPr/>
         </p:nvCxnSpPr>
         <p:spPr>
-          <a:xfrm flipV="1">
-            <a:off x="6696783" y="1497412"/>
-            <a:ext cx="449700" cy="88"/>
+          <a:xfrm>
+            <a:off x="9013954" y="1497500"/>
+            <a:ext cx="607645" cy="3734"/>
           </a:xfrm>
           <a:prstGeom prst="straightConnector1">
             <a:avLst/>
@@ -14612,7 +13423,7 @@
         </p:nvSpPr>
         <p:spPr>
           <a:xfrm>
-            <a:off x="7146483" y="1358912"/>
+            <a:off x="5369640" y="1358912"/>
             <a:ext cx="1568179" cy="276999"/>
           </a:xfrm>
           <a:prstGeom prst="rect">
@@ -14633,7 +13444,7 @@
           <a:p>
             <a:r>
               <a:rPr lang="en-US" sz="1200" dirty="0"/>
-              <a:t>5. Material transport</a:t>
+              <a:t>3. Material transport</a:t>
             </a:r>
           </a:p>
         </p:txBody>
@@ -14650,14 +13461,14 @@
           <p:cNvCxnSpPr>
             <a:cxnSpLocks/>
             <a:stCxn id="115" idx="3"/>
-            <a:endCxn id="24" idx="1"/>
+            <a:endCxn id="105" idx="1"/>
           </p:cNvCxnSpPr>
           <p:nvPr/>
         </p:nvCxnSpPr>
         <p:spPr>
           <a:xfrm>
-            <a:off x="8714662" y="1497412"/>
-            <a:ext cx="322404" cy="7713"/>
+            <a:off x="6937819" y="1497412"/>
+            <a:ext cx="299290" cy="88"/>
           </a:xfrm>
           <a:prstGeom prst="straightConnector1">
             <a:avLst/>
@@ -14698,7 +13509,7 @@
         </p:nvSpPr>
         <p:spPr>
           <a:xfrm>
-            <a:off x="9798501" y="3268949"/>
+            <a:off x="10868764" y="3268949"/>
             <a:ext cx="1099348" cy="1384995"/>
           </a:xfrm>
           <a:prstGeom prst="rect">
@@ -14755,7 +13566,7 @@
         </p:nvSpPr>
         <p:spPr>
           <a:xfrm rot="5400000">
-            <a:off x="8564481" y="3523173"/>
+            <a:off x="9716059" y="3804538"/>
             <a:ext cx="2374994" cy="253916"/>
           </a:xfrm>
           <a:prstGeom prst="rect">
@@ -14778,14 +13589,63 @@
           <a:p>
             <a:pPr algn="ctr"/>
             <a:r>
+              <a:rPr lang="en-US" sz="1050" dirty="0" err="1">
+                <a:latin typeface="Courier" pitchFamily="2" charset="0"/>
+              </a:rPr>
+              <a:t>Planet.updateBulk</a:t>
+            </a:r>
+            <a:r>
               <a:rPr lang="en-US" sz="1050" dirty="0">
                 <a:latin typeface="Courier" pitchFamily="2" charset="0"/>
               </a:rPr>
-              <a:t>Planet.update_bulk()</a:t>
-            </a:r>
-          </a:p>
-        </p:txBody>
-      </p:sp>
+              <a:t>()</a:t>
+            </a:r>
+          </a:p>
+        </p:txBody>
+      </p:sp>
+      <p:cxnSp>
+        <p:nvCxnSpPr>
+          <p:cNvPr id="78" name="Straight Connector 77">
+            <a:extLst>
+              <a:ext uri="{FF2B5EF4-FFF2-40B4-BE49-F238E27FC236}">
+                <a16:creationId xmlns:a16="http://schemas.microsoft.com/office/drawing/2014/main" id="{35717132-7881-DBEA-4774-6FCF8E1461E4}"/>
+              </a:ext>
+            </a:extLst>
+          </p:cNvPr>
+          <p:cNvCxnSpPr>
+            <a:cxnSpLocks/>
+          </p:cNvCxnSpPr>
+          <p:nvPr/>
+        </p:nvCxnSpPr>
+        <p:spPr>
+          <a:xfrm>
+            <a:off x="9267236" y="2123555"/>
+            <a:ext cx="0" cy="3899365"/>
+          </a:xfrm>
+          <a:prstGeom prst="line">
+            <a:avLst/>
+          </a:prstGeom>
+          <a:ln w="38100">
+            <a:solidFill>
+              <a:schemeClr val="tx1"/>
+            </a:solidFill>
+          </a:ln>
+        </p:spPr>
+        <p:style>
+          <a:lnRef idx="1">
+            <a:schemeClr val="accent1"/>
+          </a:lnRef>
+          <a:fillRef idx="0">
+            <a:schemeClr val="accent1"/>
+          </a:fillRef>
+          <a:effectRef idx="0">
+            <a:schemeClr val="accent1"/>
+          </a:effectRef>
+          <a:fontRef idx="minor">
+            <a:schemeClr val="tx1"/>
+          </a:fontRef>
+        </p:style>
+      </p:cxnSp>
     </p:spTree>
     <p:extLst>
       <p:ext uri="{BB962C8B-B14F-4D97-AF65-F5344CB8AC3E}">

</xml_diff>